<commit_message>
Update presentation and README, add images
</commit_message>
<xml_diff>
--- a/Presentation Group 5 .pptx
+++ b/Presentation Group 5 .pptx
@@ -22,6 +22,8 @@
     <p:sldId id="273" r:id="rId16"/>
     <p:sldId id="276" r:id="rId17"/>
     <p:sldId id="275" r:id="rId18"/>
+    <p:sldId id="277" r:id="rId19"/>
+    <p:sldId id="278" r:id="rId20"/>
   </p:sldIdLst>
   <p:sldSz cx="12192000" cy="6858000"/>
   <p:notesSz cx="6858000" cy="9144000"/>
@@ -120,7 +122,783 @@
       </a:defRPr>
     </a:lvl9pPr>
   </p:defaultTextStyle>
+  <p:extLst>
+    <p:ext uri="{EFAFB233-063F-42B5-8137-9DF3F51BA10A}">
+      <p15:sldGuideLst xmlns:p15="http://schemas.microsoft.com/office/powerpoint/2012/main"/>
+    </p:ext>
+  </p:extLst>
 </p:presentation>
+</file>
+
+<file path=ppt/revisionInfo.xml><?xml version="1.0" encoding="utf-8"?>
+<p1510:revInfo xmlns:a="http://schemas.openxmlformats.org/drawingml/2006/main" xmlns:r="http://schemas.openxmlformats.org/officeDocument/2006/relationships" xmlns:p1510="http://schemas.microsoft.com/office/powerpoint/2015/10/main">
+  <p1510:revLst>
+    <p1510:client id="{5D947E3F-F120-4B9B-814D-925CFB46FFAA}" v="2" dt="2024-05-23T09:33:37.623"/>
+  </p1510:revLst>
+</p1510:revInfo>
+</file>
+
+<file path=ppt/changesInfos/changesInfo1.xml><?xml version="1.0" encoding="utf-8"?>
+<pc:chgInfo xmlns:a="http://schemas.openxmlformats.org/drawingml/2006/main" xmlns:r="http://schemas.openxmlformats.org/officeDocument/2006/relationships" xmlns:ac="http://schemas.microsoft.com/office/drawing/2013/main/command" xmlns:pc="http://schemas.microsoft.com/office/powerpoint/2013/main/command">
+  <pc:docChgLst>
+    <pc:chgData name="Carolina Ramos" userId="98776216e67c81b9" providerId="LiveId" clId="{5D947E3F-F120-4B9B-814D-925CFB46FFAA}"/>
+    <pc:docChg chg="undo custSel addSld delSld modSld">
+      <pc:chgData name="Carolina Ramos" userId="98776216e67c81b9" providerId="LiveId" clId="{5D947E3F-F120-4B9B-814D-925CFB46FFAA}" dt="2024-05-23T10:13:17.014" v="71" actId="27636"/>
+      <pc:docMkLst>
+        <pc:docMk/>
+      </pc:docMkLst>
+      <pc:sldChg chg="addSp delSp modSp add mod">
+        <pc:chgData name="Carolina Ramos" userId="98776216e67c81b9" providerId="LiveId" clId="{5D947E3F-F120-4B9B-814D-925CFB46FFAA}" dt="2024-05-23T10:11:42.708" v="67" actId="20577"/>
+        <pc:sldMkLst>
+          <pc:docMk/>
+          <pc:sldMk cId="1270773856" sldId="277"/>
+        </pc:sldMkLst>
+        <pc:spChg chg="mod">
+          <ac:chgData name="Carolina Ramos" userId="98776216e67c81b9" providerId="LiveId" clId="{5D947E3F-F120-4B9B-814D-925CFB46FFAA}" dt="2024-05-23T09:32:43.337" v="39" actId="26606"/>
+          <ac:spMkLst>
+            <pc:docMk/>
+            <pc:sldMk cId="1270773856" sldId="277"/>
+            <ac:spMk id="2" creationId="{B51CFE8A-C6E6-5D02-538D-A6CB3DDAE7CD}"/>
+          </ac:spMkLst>
+        </pc:spChg>
+        <pc:spChg chg="mod">
+          <ac:chgData name="Carolina Ramos" userId="98776216e67c81b9" providerId="LiveId" clId="{5D947E3F-F120-4B9B-814D-925CFB46FFAA}" dt="2024-05-23T10:11:42.708" v="67" actId="20577"/>
+          <ac:spMkLst>
+            <pc:docMk/>
+            <pc:sldMk cId="1270773856" sldId="277"/>
+            <ac:spMk id="4" creationId="{131B2A30-C07F-2F8B-04B1-B74B879342CE}"/>
+          </ac:spMkLst>
+        </pc:spChg>
+        <pc:spChg chg="add del">
+          <ac:chgData name="Carolina Ramos" userId="98776216e67c81b9" providerId="LiveId" clId="{5D947E3F-F120-4B9B-814D-925CFB46FFAA}" dt="2024-05-23T09:32:43.337" v="39" actId="26606"/>
+          <ac:spMkLst>
+            <pc:docMk/>
+            <pc:sldMk cId="1270773856" sldId="277"/>
+            <ac:spMk id="59" creationId="{3756B343-807D-456E-AA26-80E96B75D13B}"/>
+          </ac:spMkLst>
+        </pc:spChg>
+        <pc:spChg chg="add del">
+          <ac:chgData name="Carolina Ramos" userId="98776216e67c81b9" providerId="LiveId" clId="{5D947E3F-F120-4B9B-814D-925CFB46FFAA}" dt="2024-05-23T09:32:43.337" v="39" actId="26606"/>
+          <ac:spMkLst>
+            <pc:docMk/>
+            <pc:sldMk cId="1270773856" sldId="277"/>
+            <ac:spMk id="61" creationId="{08980754-6F4B-43C9-B9BE-127B6BED6586}"/>
+          </ac:spMkLst>
+        </pc:spChg>
+        <pc:spChg chg="add del">
+          <ac:chgData name="Carolina Ramos" userId="98776216e67c81b9" providerId="LiveId" clId="{5D947E3F-F120-4B9B-814D-925CFB46FFAA}" dt="2024-05-23T09:32:43.337" v="39" actId="26606"/>
+          <ac:spMkLst>
+            <pc:docMk/>
+            <pc:sldMk cId="1270773856" sldId="277"/>
+            <ac:spMk id="63" creationId="{2C1BBA94-3F40-40AA-8BB9-E69E25E537C1}"/>
+          </ac:spMkLst>
+        </pc:spChg>
+        <pc:spChg chg="add del">
+          <ac:chgData name="Carolina Ramos" userId="98776216e67c81b9" providerId="LiveId" clId="{5D947E3F-F120-4B9B-814D-925CFB46FFAA}" dt="2024-05-23T09:32:43.337" v="39" actId="26606"/>
+          <ac:spMkLst>
+            <pc:docMk/>
+            <pc:sldMk cId="1270773856" sldId="277"/>
+            <ac:spMk id="65" creationId="{169CC832-2974-4E8D-90ED-3E2941BA7336}"/>
+          </ac:spMkLst>
+        </pc:spChg>
+        <pc:spChg chg="add del">
+          <ac:chgData name="Carolina Ramos" userId="98776216e67c81b9" providerId="LiveId" clId="{5D947E3F-F120-4B9B-814D-925CFB46FFAA}" dt="2024-05-23T09:32:43.337" v="39" actId="26606"/>
+          <ac:spMkLst>
+            <pc:docMk/>
+            <pc:sldMk cId="1270773856" sldId="277"/>
+            <ac:spMk id="67" creationId="{55222F96-971A-4F90-B841-6BAB416C7AC1}"/>
+          </ac:spMkLst>
+        </pc:spChg>
+        <pc:spChg chg="add del">
+          <ac:chgData name="Carolina Ramos" userId="98776216e67c81b9" providerId="LiveId" clId="{5D947E3F-F120-4B9B-814D-925CFB46FFAA}" dt="2024-05-23T09:32:08.765" v="18" actId="26606"/>
+          <ac:spMkLst>
+            <pc:docMk/>
+            <pc:sldMk cId="1270773856" sldId="277"/>
+            <ac:spMk id="72" creationId="{2F687420-BEB4-45CD-8226-339BE553B8E6}"/>
+          </ac:spMkLst>
+        </pc:spChg>
+        <pc:spChg chg="add del">
+          <ac:chgData name="Carolina Ramos" userId="98776216e67c81b9" providerId="LiveId" clId="{5D947E3F-F120-4B9B-814D-925CFB46FFAA}" dt="2024-05-23T09:32:08.765" v="18" actId="26606"/>
+          <ac:spMkLst>
+            <pc:docMk/>
+            <pc:sldMk cId="1270773856" sldId="277"/>
+            <ac:spMk id="74" creationId="{169CC832-2974-4E8D-90ED-3E2941BA7336}"/>
+          </ac:spMkLst>
+        </pc:spChg>
+        <pc:spChg chg="add del">
+          <ac:chgData name="Carolina Ramos" userId="98776216e67c81b9" providerId="LiveId" clId="{5D947E3F-F120-4B9B-814D-925CFB46FFAA}" dt="2024-05-23T09:32:08.765" v="18" actId="26606"/>
+          <ac:spMkLst>
+            <pc:docMk/>
+            <pc:sldMk cId="1270773856" sldId="277"/>
+            <ac:spMk id="76" creationId="{55222F96-971A-4F90-B841-6BAB416C7AC1}"/>
+          </ac:spMkLst>
+        </pc:spChg>
+        <pc:spChg chg="add del">
+          <ac:chgData name="Carolina Ramos" userId="98776216e67c81b9" providerId="LiveId" clId="{5D947E3F-F120-4B9B-814D-925CFB46FFAA}" dt="2024-05-23T09:32:08.765" v="18" actId="26606"/>
+          <ac:spMkLst>
+            <pc:docMk/>
+            <pc:sldMk cId="1270773856" sldId="277"/>
+            <ac:spMk id="78" creationId="{08980754-6F4B-43C9-B9BE-127B6BED6586}"/>
+          </ac:spMkLst>
+        </pc:spChg>
+        <pc:spChg chg="add del">
+          <ac:chgData name="Carolina Ramos" userId="98776216e67c81b9" providerId="LiveId" clId="{5D947E3F-F120-4B9B-814D-925CFB46FFAA}" dt="2024-05-23T09:32:08.765" v="18" actId="26606"/>
+          <ac:spMkLst>
+            <pc:docMk/>
+            <pc:sldMk cId="1270773856" sldId="277"/>
+            <ac:spMk id="80" creationId="{2C1BBA94-3F40-40AA-8BB9-E69E25E537C1}"/>
+          </ac:spMkLst>
+        </pc:spChg>
+        <pc:spChg chg="add del">
+          <ac:chgData name="Carolina Ramos" userId="98776216e67c81b9" providerId="LiveId" clId="{5D947E3F-F120-4B9B-814D-925CFB46FFAA}" dt="2024-05-23T09:32:12.236" v="20" actId="26606"/>
+          <ac:spMkLst>
+            <pc:docMk/>
+            <pc:sldMk cId="1270773856" sldId="277"/>
+            <ac:spMk id="82" creationId="{117AB3D3-3C9C-4DED-809A-78734805B895}"/>
+          </ac:spMkLst>
+        </pc:spChg>
+        <pc:spChg chg="add del">
+          <ac:chgData name="Carolina Ramos" userId="98776216e67c81b9" providerId="LiveId" clId="{5D947E3F-F120-4B9B-814D-925CFB46FFAA}" dt="2024-05-23T09:32:12.236" v="20" actId="26606"/>
+          <ac:spMkLst>
+            <pc:docMk/>
+            <pc:sldMk cId="1270773856" sldId="277"/>
+            <ac:spMk id="83" creationId="{3A9A4357-BD1D-4622-A4FE-766E6AB8DE84}"/>
+          </ac:spMkLst>
+        </pc:spChg>
+        <pc:spChg chg="add del">
+          <ac:chgData name="Carolina Ramos" userId="98776216e67c81b9" providerId="LiveId" clId="{5D947E3F-F120-4B9B-814D-925CFB46FFAA}" dt="2024-05-23T09:32:12.236" v="20" actId="26606"/>
+          <ac:spMkLst>
+            <pc:docMk/>
+            <pc:sldMk cId="1270773856" sldId="277"/>
+            <ac:spMk id="84" creationId="{E659831F-0D9A-4C63-9EBB-8435B85A440F}"/>
+          </ac:spMkLst>
+        </pc:spChg>
+        <pc:spChg chg="add del">
+          <ac:chgData name="Carolina Ramos" userId="98776216e67c81b9" providerId="LiveId" clId="{5D947E3F-F120-4B9B-814D-925CFB46FFAA}" dt="2024-05-23T09:32:12.236" v="20" actId="26606"/>
+          <ac:spMkLst>
+            <pc:docMk/>
+            <pc:sldMk cId="1270773856" sldId="277"/>
+            <ac:spMk id="85" creationId="{E6995CE5-F890-4ABA-82A2-26507CE8D2A3}"/>
+          </ac:spMkLst>
+        </pc:spChg>
+        <pc:spChg chg="add del">
+          <ac:chgData name="Carolina Ramos" userId="98776216e67c81b9" providerId="LiveId" clId="{5D947E3F-F120-4B9B-814D-925CFB46FFAA}" dt="2024-05-23T09:32:13.610" v="22" actId="26606"/>
+          <ac:spMkLst>
+            <pc:docMk/>
+            <pc:sldMk cId="1270773856" sldId="277"/>
+            <ac:spMk id="87" creationId="{2F687420-BEB4-45CD-8226-339BE553B8E6}"/>
+          </ac:spMkLst>
+        </pc:spChg>
+        <pc:spChg chg="add del">
+          <ac:chgData name="Carolina Ramos" userId="98776216e67c81b9" providerId="LiveId" clId="{5D947E3F-F120-4B9B-814D-925CFB46FFAA}" dt="2024-05-23T09:32:13.610" v="22" actId="26606"/>
+          <ac:spMkLst>
+            <pc:docMk/>
+            <pc:sldMk cId="1270773856" sldId="277"/>
+            <ac:spMk id="88" creationId="{169CC832-2974-4E8D-90ED-3E2941BA7336}"/>
+          </ac:spMkLst>
+        </pc:spChg>
+        <pc:spChg chg="add del">
+          <ac:chgData name="Carolina Ramos" userId="98776216e67c81b9" providerId="LiveId" clId="{5D947E3F-F120-4B9B-814D-925CFB46FFAA}" dt="2024-05-23T09:32:13.610" v="22" actId="26606"/>
+          <ac:spMkLst>
+            <pc:docMk/>
+            <pc:sldMk cId="1270773856" sldId="277"/>
+            <ac:spMk id="89" creationId="{55222F96-971A-4F90-B841-6BAB416C7AC1}"/>
+          </ac:spMkLst>
+        </pc:spChg>
+        <pc:spChg chg="add del">
+          <ac:chgData name="Carolina Ramos" userId="98776216e67c81b9" providerId="LiveId" clId="{5D947E3F-F120-4B9B-814D-925CFB46FFAA}" dt="2024-05-23T09:32:13.610" v="22" actId="26606"/>
+          <ac:spMkLst>
+            <pc:docMk/>
+            <pc:sldMk cId="1270773856" sldId="277"/>
+            <ac:spMk id="90" creationId="{08980754-6F4B-43C9-B9BE-127B6BED6586}"/>
+          </ac:spMkLst>
+        </pc:spChg>
+        <pc:spChg chg="add del">
+          <ac:chgData name="Carolina Ramos" userId="98776216e67c81b9" providerId="LiveId" clId="{5D947E3F-F120-4B9B-814D-925CFB46FFAA}" dt="2024-05-23T09:32:13.610" v="22" actId="26606"/>
+          <ac:spMkLst>
+            <pc:docMk/>
+            <pc:sldMk cId="1270773856" sldId="277"/>
+            <ac:spMk id="91" creationId="{2C1BBA94-3F40-40AA-8BB9-E69E25E537C1}"/>
+          </ac:spMkLst>
+        </pc:spChg>
+        <pc:spChg chg="add del">
+          <ac:chgData name="Carolina Ramos" userId="98776216e67c81b9" providerId="LiveId" clId="{5D947E3F-F120-4B9B-814D-925CFB46FFAA}" dt="2024-05-23T09:32:15.827" v="24" actId="26606"/>
+          <ac:spMkLst>
+            <pc:docMk/>
+            <pc:sldMk cId="1270773856" sldId="277"/>
+            <ac:spMk id="93" creationId="{327D73B4-9F5C-4A64-A179-51B9500CB8B5}"/>
+          </ac:spMkLst>
+        </pc:spChg>
+        <pc:spChg chg="add del">
+          <ac:chgData name="Carolina Ramos" userId="98776216e67c81b9" providerId="LiveId" clId="{5D947E3F-F120-4B9B-814D-925CFB46FFAA}" dt="2024-05-23T09:32:15.827" v="24" actId="26606"/>
+          <ac:spMkLst>
+            <pc:docMk/>
+            <pc:sldMk cId="1270773856" sldId="277"/>
+            <ac:spMk id="94" creationId="{C1F06963-6374-4B48-844F-071A9BAAAE02}"/>
+          </ac:spMkLst>
+        </pc:spChg>
+        <pc:spChg chg="add del">
+          <ac:chgData name="Carolina Ramos" userId="98776216e67c81b9" providerId="LiveId" clId="{5D947E3F-F120-4B9B-814D-925CFB46FFAA}" dt="2024-05-23T09:32:15.827" v="24" actId="26606"/>
+          <ac:spMkLst>
+            <pc:docMk/>
+            <pc:sldMk cId="1270773856" sldId="277"/>
+            <ac:spMk id="95" creationId="{6CB927A4-E432-4310-9CD5-E89FF5063179}"/>
+          </ac:spMkLst>
+        </pc:spChg>
+        <pc:spChg chg="add del">
+          <ac:chgData name="Carolina Ramos" userId="98776216e67c81b9" providerId="LiveId" clId="{5D947E3F-F120-4B9B-814D-925CFB46FFAA}" dt="2024-05-23T09:32:15.827" v="24" actId="26606"/>
+          <ac:spMkLst>
+            <pc:docMk/>
+            <pc:sldMk cId="1270773856" sldId="277"/>
+            <ac:spMk id="96" creationId="{1453BF6C-B012-48B7-B4E8-6D7AC7C27D02}"/>
+          </ac:spMkLst>
+        </pc:spChg>
+        <pc:spChg chg="add del">
+          <ac:chgData name="Carolina Ramos" userId="98776216e67c81b9" providerId="LiveId" clId="{5D947E3F-F120-4B9B-814D-925CFB46FFAA}" dt="2024-05-23T09:32:15.827" v="24" actId="26606"/>
+          <ac:spMkLst>
+            <pc:docMk/>
+            <pc:sldMk cId="1270773856" sldId="277"/>
+            <ac:spMk id="97" creationId="{E3020543-B24B-4EC4-8FFC-8DD88EEA91A8}"/>
+          </ac:spMkLst>
+        </pc:spChg>
+        <pc:spChg chg="add del">
+          <ac:chgData name="Carolina Ramos" userId="98776216e67c81b9" providerId="LiveId" clId="{5D947E3F-F120-4B9B-814D-925CFB46FFAA}" dt="2024-05-23T09:32:19.557" v="26" actId="26606"/>
+          <ac:spMkLst>
+            <pc:docMk/>
+            <pc:sldMk cId="1270773856" sldId="277"/>
+            <ac:spMk id="100" creationId="{2F687420-BEB4-45CD-8226-339BE553B8E6}"/>
+          </ac:spMkLst>
+        </pc:spChg>
+        <pc:spChg chg="add del">
+          <ac:chgData name="Carolina Ramos" userId="98776216e67c81b9" providerId="LiveId" clId="{5D947E3F-F120-4B9B-814D-925CFB46FFAA}" dt="2024-05-23T09:32:19.557" v="26" actId="26606"/>
+          <ac:spMkLst>
+            <pc:docMk/>
+            <pc:sldMk cId="1270773856" sldId="277"/>
+            <ac:spMk id="101" creationId="{169CC832-2974-4E8D-90ED-3E2941BA7336}"/>
+          </ac:spMkLst>
+        </pc:spChg>
+        <pc:spChg chg="add del">
+          <ac:chgData name="Carolina Ramos" userId="98776216e67c81b9" providerId="LiveId" clId="{5D947E3F-F120-4B9B-814D-925CFB46FFAA}" dt="2024-05-23T09:32:19.557" v="26" actId="26606"/>
+          <ac:spMkLst>
+            <pc:docMk/>
+            <pc:sldMk cId="1270773856" sldId="277"/>
+            <ac:spMk id="102" creationId="{55222F96-971A-4F90-B841-6BAB416C7AC1}"/>
+          </ac:spMkLst>
+        </pc:spChg>
+        <pc:spChg chg="add del">
+          <ac:chgData name="Carolina Ramos" userId="98776216e67c81b9" providerId="LiveId" clId="{5D947E3F-F120-4B9B-814D-925CFB46FFAA}" dt="2024-05-23T09:32:19.557" v="26" actId="26606"/>
+          <ac:spMkLst>
+            <pc:docMk/>
+            <pc:sldMk cId="1270773856" sldId="277"/>
+            <ac:spMk id="103" creationId="{08980754-6F4B-43C9-B9BE-127B6BED6586}"/>
+          </ac:spMkLst>
+        </pc:spChg>
+        <pc:spChg chg="add del">
+          <ac:chgData name="Carolina Ramos" userId="98776216e67c81b9" providerId="LiveId" clId="{5D947E3F-F120-4B9B-814D-925CFB46FFAA}" dt="2024-05-23T09:32:19.557" v="26" actId="26606"/>
+          <ac:spMkLst>
+            <pc:docMk/>
+            <pc:sldMk cId="1270773856" sldId="277"/>
+            <ac:spMk id="104" creationId="{2C1BBA94-3F40-40AA-8BB9-E69E25E537C1}"/>
+          </ac:spMkLst>
+        </pc:spChg>
+        <pc:spChg chg="add del">
+          <ac:chgData name="Carolina Ramos" userId="98776216e67c81b9" providerId="LiveId" clId="{5D947E3F-F120-4B9B-814D-925CFB46FFAA}" dt="2024-05-23T09:32:21.530" v="28" actId="26606"/>
+          <ac:spMkLst>
+            <pc:docMk/>
+            <pc:sldMk cId="1270773856" sldId="277"/>
+            <ac:spMk id="106" creationId="{45D37F4E-DDB4-456B-97E0-9937730A039F}"/>
+          </ac:spMkLst>
+        </pc:spChg>
+        <pc:spChg chg="add del">
+          <ac:chgData name="Carolina Ramos" userId="98776216e67c81b9" providerId="LiveId" clId="{5D947E3F-F120-4B9B-814D-925CFB46FFAA}" dt="2024-05-23T09:32:21.530" v="28" actId="26606"/>
+          <ac:spMkLst>
+            <pc:docMk/>
+            <pc:sldMk cId="1270773856" sldId="277"/>
+            <ac:spMk id="107" creationId="{B2DD41CD-8F47-4F56-AD12-4E2FF7696987}"/>
+          </ac:spMkLst>
+        </pc:spChg>
+        <pc:spChg chg="add del">
+          <ac:chgData name="Carolina Ramos" userId="98776216e67c81b9" providerId="LiveId" clId="{5D947E3F-F120-4B9B-814D-925CFB46FFAA}" dt="2024-05-23T09:32:28.037" v="30" actId="26606"/>
+          <ac:spMkLst>
+            <pc:docMk/>
+            <pc:sldMk cId="1270773856" sldId="277"/>
+            <ac:spMk id="109" creationId="{117AB3D3-3C9C-4DED-809A-78734805B895}"/>
+          </ac:spMkLst>
+        </pc:spChg>
+        <pc:spChg chg="add del">
+          <ac:chgData name="Carolina Ramos" userId="98776216e67c81b9" providerId="LiveId" clId="{5D947E3F-F120-4B9B-814D-925CFB46FFAA}" dt="2024-05-23T09:32:28.037" v="30" actId="26606"/>
+          <ac:spMkLst>
+            <pc:docMk/>
+            <pc:sldMk cId="1270773856" sldId="277"/>
+            <ac:spMk id="110" creationId="{3A9A4357-BD1D-4622-A4FE-766E6AB8DE84}"/>
+          </ac:spMkLst>
+        </pc:spChg>
+        <pc:spChg chg="add del">
+          <ac:chgData name="Carolina Ramos" userId="98776216e67c81b9" providerId="LiveId" clId="{5D947E3F-F120-4B9B-814D-925CFB46FFAA}" dt="2024-05-23T09:32:28.037" v="30" actId="26606"/>
+          <ac:spMkLst>
+            <pc:docMk/>
+            <pc:sldMk cId="1270773856" sldId="277"/>
+            <ac:spMk id="111" creationId="{E659831F-0D9A-4C63-9EBB-8435B85A440F}"/>
+          </ac:spMkLst>
+        </pc:spChg>
+        <pc:spChg chg="add del">
+          <ac:chgData name="Carolina Ramos" userId="98776216e67c81b9" providerId="LiveId" clId="{5D947E3F-F120-4B9B-814D-925CFB46FFAA}" dt="2024-05-23T09:32:28.037" v="30" actId="26606"/>
+          <ac:spMkLst>
+            <pc:docMk/>
+            <pc:sldMk cId="1270773856" sldId="277"/>
+            <ac:spMk id="112" creationId="{E6995CE5-F890-4ABA-82A2-26507CE8D2A3}"/>
+          </ac:spMkLst>
+        </pc:spChg>
+        <pc:spChg chg="add del">
+          <ac:chgData name="Carolina Ramos" userId="98776216e67c81b9" providerId="LiveId" clId="{5D947E3F-F120-4B9B-814D-925CFB46FFAA}" dt="2024-05-23T09:32:36.141" v="32" actId="26606"/>
+          <ac:spMkLst>
+            <pc:docMk/>
+            <pc:sldMk cId="1270773856" sldId="277"/>
+            <ac:spMk id="114" creationId="{201CC55D-ED54-4C5C-95E6-10947BD1103B}"/>
+          </ac:spMkLst>
+        </pc:spChg>
+        <pc:spChg chg="add del">
+          <ac:chgData name="Carolina Ramos" userId="98776216e67c81b9" providerId="LiveId" clId="{5D947E3F-F120-4B9B-814D-925CFB46FFAA}" dt="2024-05-23T09:32:36.141" v="32" actId="26606"/>
+          <ac:spMkLst>
+            <pc:docMk/>
+            <pc:sldMk cId="1270773856" sldId="277"/>
+            <ac:spMk id="117" creationId="{3873B707-463F-40B0-8227-E8CC6C67EB25}"/>
+          </ac:spMkLst>
+        </pc:spChg>
+        <pc:spChg chg="add del">
+          <ac:chgData name="Carolina Ramos" userId="98776216e67c81b9" providerId="LiveId" clId="{5D947E3F-F120-4B9B-814D-925CFB46FFAA}" dt="2024-05-23T09:32:36.141" v="32" actId="26606"/>
+          <ac:spMkLst>
+            <pc:docMk/>
+            <pc:sldMk cId="1270773856" sldId="277"/>
+            <ac:spMk id="118" creationId="{C13237C8-E62C-4F0D-A318-BD6FB6C2D138}"/>
+          </ac:spMkLst>
+        </pc:spChg>
+        <pc:spChg chg="add del">
+          <ac:chgData name="Carolina Ramos" userId="98776216e67c81b9" providerId="LiveId" clId="{5D947E3F-F120-4B9B-814D-925CFB46FFAA}" dt="2024-05-23T09:32:36.141" v="32" actId="26606"/>
+          <ac:spMkLst>
+            <pc:docMk/>
+            <pc:sldMk cId="1270773856" sldId="277"/>
+            <ac:spMk id="119" creationId="{19C9EAEA-39D0-4B0E-A0EB-51E7B26740B1}"/>
+          </ac:spMkLst>
+        </pc:spChg>
+        <pc:spChg chg="add del">
+          <ac:chgData name="Carolina Ramos" userId="98776216e67c81b9" providerId="LiveId" clId="{5D947E3F-F120-4B9B-814D-925CFB46FFAA}" dt="2024-05-23T09:32:37.971" v="34" actId="26606"/>
+          <ac:spMkLst>
+            <pc:docMk/>
+            <pc:sldMk cId="1270773856" sldId="277"/>
+            <ac:spMk id="121" creationId="{058A14AF-9FB5-4CC7-BA35-E8E85D3EDF0E}"/>
+          </ac:spMkLst>
+        </pc:spChg>
+        <pc:spChg chg="add del">
+          <ac:chgData name="Carolina Ramos" userId="98776216e67c81b9" providerId="LiveId" clId="{5D947E3F-F120-4B9B-814D-925CFB46FFAA}" dt="2024-05-23T09:32:37.971" v="34" actId="26606"/>
+          <ac:spMkLst>
+            <pc:docMk/>
+            <pc:sldMk cId="1270773856" sldId="277"/>
+            <ac:spMk id="122" creationId="{3A9A4357-BD1D-4622-A4FE-766E6AB8DE84}"/>
+          </ac:spMkLst>
+        </pc:spChg>
+        <pc:spChg chg="add del">
+          <ac:chgData name="Carolina Ramos" userId="98776216e67c81b9" providerId="LiveId" clId="{5D947E3F-F120-4B9B-814D-925CFB46FFAA}" dt="2024-05-23T09:32:37.971" v="34" actId="26606"/>
+          <ac:spMkLst>
+            <pc:docMk/>
+            <pc:sldMk cId="1270773856" sldId="277"/>
+            <ac:spMk id="123" creationId="{E659831F-0D9A-4C63-9EBB-8435B85A440F}"/>
+          </ac:spMkLst>
+        </pc:spChg>
+        <pc:spChg chg="add del">
+          <ac:chgData name="Carolina Ramos" userId="98776216e67c81b9" providerId="LiveId" clId="{5D947E3F-F120-4B9B-814D-925CFB46FFAA}" dt="2024-05-23T09:32:37.971" v="34" actId="26606"/>
+          <ac:spMkLst>
+            <pc:docMk/>
+            <pc:sldMk cId="1270773856" sldId="277"/>
+            <ac:spMk id="124" creationId="{E6995CE5-F890-4ABA-82A2-26507CE8D2A3}"/>
+          </ac:spMkLst>
+        </pc:spChg>
+        <pc:spChg chg="add del">
+          <ac:chgData name="Carolina Ramos" userId="98776216e67c81b9" providerId="LiveId" clId="{5D947E3F-F120-4B9B-814D-925CFB46FFAA}" dt="2024-05-23T09:32:40.132" v="36" actId="26606"/>
+          <ac:spMkLst>
+            <pc:docMk/>
+            <pc:sldMk cId="1270773856" sldId="277"/>
+            <ac:spMk id="126" creationId="{201CC55D-ED54-4C5C-95E6-10947BD1103B}"/>
+          </ac:spMkLst>
+        </pc:spChg>
+        <pc:spChg chg="add del">
+          <ac:chgData name="Carolina Ramos" userId="98776216e67c81b9" providerId="LiveId" clId="{5D947E3F-F120-4B9B-814D-925CFB46FFAA}" dt="2024-05-23T09:32:40.132" v="36" actId="26606"/>
+          <ac:spMkLst>
+            <pc:docMk/>
+            <pc:sldMk cId="1270773856" sldId="277"/>
+            <ac:spMk id="129" creationId="{3873B707-463F-40B0-8227-E8CC6C67EB25}"/>
+          </ac:spMkLst>
+        </pc:spChg>
+        <pc:spChg chg="add del">
+          <ac:chgData name="Carolina Ramos" userId="98776216e67c81b9" providerId="LiveId" clId="{5D947E3F-F120-4B9B-814D-925CFB46FFAA}" dt="2024-05-23T09:32:40.132" v="36" actId="26606"/>
+          <ac:spMkLst>
+            <pc:docMk/>
+            <pc:sldMk cId="1270773856" sldId="277"/>
+            <ac:spMk id="130" creationId="{C13237C8-E62C-4F0D-A318-BD6FB6C2D138}"/>
+          </ac:spMkLst>
+        </pc:spChg>
+        <pc:spChg chg="add del">
+          <ac:chgData name="Carolina Ramos" userId="98776216e67c81b9" providerId="LiveId" clId="{5D947E3F-F120-4B9B-814D-925CFB46FFAA}" dt="2024-05-23T09:32:40.132" v="36" actId="26606"/>
+          <ac:spMkLst>
+            <pc:docMk/>
+            <pc:sldMk cId="1270773856" sldId="277"/>
+            <ac:spMk id="131" creationId="{19C9EAEA-39D0-4B0E-A0EB-51E7B26740B1}"/>
+          </ac:spMkLst>
+        </pc:spChg>
+        <pc:spChg chg="add del">
+          <ac:chgData name="Carolina Ramos" userId="98776216e67c81b9" providerId="LiveId" clId="{5D947E3F-F120-4B9B-814D-925CFB46FFAA}" dt="2024-05-23T09:32:43.327" v="38" actId="26606"/>
+          <ac:spMkLst>
+            <pc:docMk/>
+            <pc:sldMk cId="1270773856" sldId="277"/>
+            <ac:spMk id="133" creationId="{117AB3D3-3C9C-4DED-809A-78734805B895}"/>
+          </ac:spMkLst>
+        </pc:spChg>
+        <pc:spChg chg="add del">
+          <ac:chgData name="Carolina Ramos" userId="98776216e67c81b9" providerId="LiveId" clId="{5D947E3F-F120-4B9B-814D-925CFB46FFAA}" dt="2024-05-23T09:32:43.327" v="38" actId="26606"/>
+          <ac:spMkLst>
+            <pc:docMk/>
+            <pc:sldMk cId="1270773856" sldId="277"/>
+            <ac:spMk id="134" creationId="{3A9A4357-BD1D-4622-A4FE-766E6AB8DE84}"/>
+          </ac:spMkLst>
+        </pc:spChg>
+        <pc:spChg chg="add del">
+          <ac:chgData name="Carolina Ramos" userId="98776216e67c81b9" providerId="LiveId" clId="{5D947E3F-F120-4B9B-814D-925CFB46FFAA}" dt="2024-05-23T09:32:43.327" v="38" actId="26606"/>
+          <ac:spMkLst>
+            <pc:docMk/>
+            <pc:sldMk cId="1270773856" sldId="277"/>
+            <ac:spMk id="135" creationId="{E659831F-0D9A-4C63-9EBB-8435B85A440F}"/>
+          </ac:spMkLst>
+        </pc:spChg>
+        <pc:spChg chg="add del">
+          <ac:chgData name="Carolina Ramos" userId="98776216e67c81b9" providerId="LiveId" clId="{5D947E3F-F120-4B9B-814D-925CFB46FFAA}" dt="2024-05-23T09:32:43.327" v="38" actId="26606"/>
+          <ac:spMkLst>
+            <pc:docMk/>
+            <pc:sldMk cId="1270773856" sldId="277"/>
+            <ac:spMk id="136" creationId="{E6995CE5-F890-4ABA-82A2-26507CE8D2A3}"/>
+          </ac:spMkLst>
+        </pc:spChg>
+        <pc:spChg chg="add">
+          <ac:chgData name="Carolina Ramos" userId="98776216e67c81b9" providerId="LiveId" clId="{5D947E3F-F120-4B9B-814D-925CFB46FFAA}" dt="2024-05-23T09:32:43.337" v="39" actId="26606"/>
+          <ac:spMkLst>
+            <pc:docMk/>
+            <pc:sldMk cId="1270773856" sldId="277"/>
+            <ac:spMk id="138" creationId="{201CC55D-ED54-4C5C-95E6-10947BD1103B}"/>
+          </ac:spMkLst>
+        </pc:spChg>
+        <pc:spChg chg="add">
+          <ac:chgData name="Carolina Ramos" userId="98776216e67c81b9" providerId="LiveId" clId="{5D947E3F-F120-4B9B-814D-925CFB46FFAA}" dt="2024-05-23T09:32:43.337" v="39" actId="26606"/>
+          <ac:spMkLst>
+            <pc:docMk/>
+            <pc:sldMk cId="1270773856" sldId="277"/>
+            <ac:spMk id="141" creationId="{3873B707-463F-40B0-8227-E8CC6C67EB25}"/>
+          </ac:spMkLst>
+        </pc:spChg>
+        <pc:spChg chg="add">
+          <ac:chgData name="Carolina Ramos" userId="98776216e67c81b9" providerId="LiveId" clId="{5D947E3F-F120-4B9B-814D-925CFB46FFAA}" dt="2024-05-23T09:32:43.337" v="39" actId="26606"/>
+          <ac:spMkLst>
+            <pc:docMk/>
+            <pc:sldMk cId="1270773856" sldId="277"/>
+            <ac:spMk id="142" creationId="{C13237C8-E62C-4F0D-A318-BD6FB6C2D138}"/>
+          </ac:spMkLst>
+        </pc:spChg>
+        <pc:spChg chg="add">
+          <ac:chgData name="Carolina Ramos" userId="98776216e67c81b9" providerId="LiveId" clId="{5D947E3F-F120-4B9B-814D-925CFB46FFAA}" dt="2024-05-23T09:32:43.337" v="39" actId="26606"/>
+          <ac:spMkLst>
+            <pc:docMk/>
+            <pc:sldMk cId="1270773856" sldId="277"/>
+            <ac:spMk id="143" creationId="{19C9EAEA-39D0-4B0E-A0EB-51E7B26740B1}"/>
+          </ac:spMkLst>
+        </pc:spChg>
+        <pc:grpChg chg="add del">
+          <ac:chgData name="Carolina Ramos" userId="98776216e67c81b9" providerId="LiveId" clId="{5D947E3F-F120-4B9B-814D-925CFB46FFAA}" dt="2024-05-23T09:32:36.141" v="32" actId="26606"/>
+          <ac:grpSpMkLst>
+            <pc:docMk/>
+            <pc:sldMk cId="1270773856" sldId="277"/>
+            <ac:grpSpMk id="115" creationId="{1DE889C7-FAD6-4397-98E2-05D503484459}"/>
+          </ac:grpSpMkLst>
+        </pc:grpChg>
+        <pc:grpChg chg="add del">
+          <ac:chgData name="Carolina Ramos" userId="98776216e67c81b9" providerId="LiveId" clId="{5D947E3F-F120-4B9B-814D-925CFB46FFAA}" dt="2024-05-23T09:32:40.132" v="36" actId="26606"/>
+          <ac:grpSpMkLst>
+            <pc:docMk/>
+            <pc:sldMk cId="1270773856" sldId="277"/>
+            <ac:grpSpMk id="127" creationId="{1DE889C7-FAD6-4397-98E2-05D503484459}"/>
+          </ac:grpSpMkLst>
+        </pc:grpChg>
+        <pc:grpChg chg="add">
+          <ac:chgData name="Carolina Ramos" userId="98776216e67c81b9" providerId="LiveId" clId="{5D947E3F-F120-4B9B-814D-925CFB46FFAA}" dt="2024-05-23T09:32:43.337" v="39" actId="26606"/>
+          <ac:grpSpMkLst>
+            <pc:docMk/>
+            <pc:sldMk cId="1270773856" sldId="277"/>
+            <ac:grpSpMk id="139" creationId="{1DE889C7-FAD6-4397-98E2-05D503484459}"/>
+          </ac:grpSpMkLst>
+        </pc:grpChg>
+        <pc:picChg chg="mod ord">
+          <ac:chgData name="Carolina Ramos" userId="98776216e67c81b9" providerId="LiveId" clId="{5D947E3F-F120-4B9B-814D-925CFB46FFAA}" dt="2024-05-23T09:32:43.337" v="39" actId="26606"/>
+          <ac:picMkLst>
+            <pc:docMk/>
+            <pc:sldMk cId="1270773856" sldId="277"/>
+            <ac:picMk id="8" creationId="{127D63FC-4FED-53C4-4789-2758F2ED8C5C}"/>
+          </ac:picMkLst>
+        </pc:picChg>
+        <pc:cxnChg chg="add del">
+          <ac:chgData name="Carolina Ramos" userId="98776216e67c81b9" providerId="LiveId" clId="{5D947E3F-F120-4B9B-814D-925CFB46FFAA}" dt="2024-05-23T09:32:15.827" v="24" actId="26606"/>
+          <ac:cxnSpMkLst>
+            <pc:docMk/>
+            <pc:sldMk cId="1270773856" sldId="277"/>
+            <ac:cxnSpMk id="98" creationId="{C49DA8F6-BCC1-4447-B54C-57856834B94B}"/>
+          </ac:cxnSpMkLst>
+        </pc:cxnChg>
+      </pc:sldChg>
+      <pc:sldChg chg="add del">
+        <pc:chgData name="Carolina Ramos" userId="98776216e67c81b9" providerId="LiveId" clId="{5D947E3F-F120-4B9B-814D-925CFB46FFAA}" dt="2024-05-23T09:28:35.671" v="1" actId="2696"/>
+        <pc:sldMkLst>
+          <pc:docMk/>
+          <pc:sldMk cId="1612731020" sldId="277"/>
+        </pc:sldMkLst>
+      </pc:sldChg>
+      <pc:sldChg chg="addSp delSp modSp add mod">
+        <pc:chgData name="Carolina Ramos" userId="98776216e67c81b9" providerId="LiveId" clId="{5D947E3F-F120-4B9B-814D-925CFB46FFAA}" dt="2024-05-23T10:13:17.014" v="71" actId="27636"/>
+        <pc:sldMkLst>
+          <pc:docMk/>
+          <pc:sldMk cId="3000181564" sldId="278"/>
+        </pc:sldMkLst>
+        <pc:spChg chg="mod">
+          <ac:chgData name="Carolina Ramos" userId="98776216e67c81b9" providerId="LiveId" clId="{5D947E3F-F120-4B9B-814D-925CFB46FFAA}" dt="2024-05-23T09:33:57.099" v="62" actId="26606"/>
+          <ac:spMkLst>
+            <pc:docMk/>
+            <pc:sldMk cId="3000181564" sldId="278"/>
+            <ac:spMk id="2" creationId="{B51CFE8A-C6E6-5D02-538D-A6CB3DDAE7CD}"/>
+          </ac:spMkLst>
+        </pc:spChg>
+        <pc:spChg chg="mod">
+          <ac:chgData name="Carolina Ramos" userId="98776216e67c81b9" providerId="LiveId" clId="{5D947E3F-F120-4B9B-814D-925CFB46FFAA}" dt="2024-05-23T10:13:17.014" v="71" actId="27636"/>
+          <ac:spMkLst>
+            <pc:docMk/>
+            <pc:sldMk cId="3000181564" sldId="278"/>
+            <ac:spMk id="4" creationId="{131B2A30-C07F-2F8B-04B1-B74B879342CE}"/>
+          </ac:spMkLst>
+        </pc:spChg>
+        <pc:spChg chg="add del">
+          <ac:chgData name="Carolina Ramos" userId="98776216e67c81b9" providerId="LiveId" clId="{5D947E3F-F120-4B9B-814D-925CFB46FFAA}" dt="2024-05-23T09:33:57.109" v="63" actId="26606"/>
+          <ac:spMkLst>
+            <pc:docMk/>
+            <pc:sldMk cId="3000181564" sldId="278"/>
+            <ac:spMk id="138" creationId="{201CC55D-ED54-4C5C-95E6-10947BD1103B}"/>
+          </ac:spMkLst>
+        </pc:spChg>
+        <pc:spChg chg="add del">
+          <ac:chgData name="Carolina Ramos" userId="98776216e67c81b9" providerId="LiveId" clId="{5D947E3F-F120-4B9B-814D-925CFB46FFAA}" dt="2024-05-23T09:33:57.109" v="63" actId="26606"/>
+          <ac:spMkLst>
+            <pc:docMk/>
+            <pc:sldMk cId="3000181564" sldId="278"/>
+            <ac:spMk id="141" creationId="{3873B707-463F-40B0-8227-E8CC6C67EB25}"/>
+          </ac:spMkLst>
+        </pc:spChg>
+        <pc:spChg chg="add del">
+          <ac:chgData name="Carolina Ramos" userId="98776216e67c81b9" providerId="LiveId" clId="{5D947E3F-F120-4B9B-814D-925CFB46FFAA}" dt="2024-05-23T09:33:57.109" v="63" actId="26606"/>
+          <ac:spMkLst>
+            <pc:docMk/>
+            <pc:sldMk cId="3000181564" sldId="278"/>
+            <ac:spMk id="142" creationId="{C13237C8-E62C-4F0D-A318-BD6FB6C2D138}"/>
+          </ac:spMkLst>
+        </pc:spChg>
+        <pc:spChg chg="add del">
+          <ac:chgData name="Carolina Ramos" userId="98776216e67c81b9" providerId="LiveId" clId="{5D947E3F-F120-4B9B-814D-925CFB46FFAA}" dt="2024-05-23T09:33:57.109" v="63" actId="26606"/>
+          <ac:spMkLst>
+            <pc:docMk/>
+            <pc:sldMk cId="3000181564" sldId="278"/>
+            <ac:spMk id="143" creationId="{19C9EAEA-39D0-4B0E-A0EB-51E7B26740B1}"/>
+          </ac:spMkLst>
+        </pc:spChg>
+        <pc:spChg chg="add del">
+          <ac:chgData name="Carolina Ramos" userId="98776216e67c81b9" providerId="LiveId" clId="{5D947E3F-F120-4B9B-814D-925CFB46FFAA}" dt="2024-05-23T09:33:48.151" v="56" actId="26606"/>
+          <ac:spMkLst>
+            <pc:docMk/>
+            <pc:sldMk cId="3000181564" sldId="278"/>
+            <ac:spMk id="148" creationId="{201CC55D-ED54-4C5C-95E6-10947BD1103B}"/>
+          </ac:spMkLst>
+        </pc:spChg>
+        <pc:spChg chg="add del">
+          <ac:chgData name="Carolina Ramos" userId="98776216e67c81b9" providerId="LiveId" clId="{5D947E3F-F120-4B9B-814D-925CFB46FFAA}" dt="2024-05-23T09:33:48.151" v="56" actId="26606"/>
+          <ac:spMkLst>
+            <pc:docMk/>
+            <pc:sldMk cId="3000181564" sldId="278"/>
+            <ac:spMk id="154" creationId="{3873B707-463F-40B0-8227-E8CC6C67EB25}"/>
+          </ac:spMkLst>
+        </pc:spChg>
+        <pc:spChg chg="add del">
+          <ac:chgData name="Carolina Ramos" userId="98776216e67c81b9" providerId="LiveId" clId="{5D947E3F-F120-4B9B-814D-925CFB46FFAA}" dt="2024-05-23T09:33:48.151" v="56" actId="26606"/>
+          <ac:spMkLst>
+            <pc:docMk/>
+            <pc:sldMk cId="3000181564" sldId="278"/>
+            <ac:spMk id="156" creationId="{C13237C8-E62C-4F0D-A318-BD6FB6C2D138}"/>
+          </ac:spMkLst>
+        </pc:spChg>
+        <pc:spChg chg="add del">
+          <ac:chgData name="Carolina Ramos" userId="98776216e67c81b9" providerId="LiveId" clId="{5D947E3F-F120-4B9B-814D-925CFB46FFAA}" dt="2024-05-23T09:33:48.151" v="56" actId="26606"/>
+          <ac:spMkLst>
+            <pc:docMk/>
+            <pc:sldMk cId="3000181564" sldId="278"/>
+            <ac:spMk id="158" creationId="{19C9EAEA-39D0-4B0E-A0EB-51E7B26740B1}"/>
+          </ac:spMkLst>
+        </pc:spChg>
+        <pc:spChg chg="add del">
+          <ac:chgData name="Carolina Ramos" userId="98776216e67c81b9" providerId="LiveId" clId="{5D947E3F-F120-4B9B-814D-925CFB46FFAA}" dt="2024-05-23T09:33:50.792" v="58" actId="26606"/>
+          <ac:spMkLst>
+            <pc:docMk/>
+            <pc:sldMk cId="3000181564" sldId="278"/>
+            <ac:spMk id="160" creationId="{45D37F4E-DDB4-456B-97E0-9937730A039F}"/>
+          </ac:spMkLst>
+        </pc:spChg>
+        <pc:spChg chg="add del">
+          <ac:chgData name="Carolina Ramos" userId="98776216e67c81b9" providerId="LiveId" clId="{5D947E3F-F120-4B9B-814D-925CFB46FFAA}" dt="2024-05-23T09:33:50.792" v="58" actId="26606"/>
+          <ac:spMkLst>
+            <pc:docMk/>
+            <pc:sldMk cId="3000181564" sldId="278"/>
+            <ac:spMk id="161" creationId="{B2DD41CD-8F47-4F56-AD12-4E2FF7696987}"/>
+          </ac:spMkLst>
+        </pc:spChg>
+        <pc:spChg chg="add del">
+          <ac:chgData name="Carolina Ramos" userId="98776216e67c81b9" providerId="LiveId" clId="{5D947E3F-F120-4B9B-814D-925CFB46FFAA}" dt="2024-05-23T09:33:54.376" v="60" actId="26606"/>
+          <ac:spMkLst>
+            <pc:docMk/>
+            <pc:sldMk cId="3000181564" sldId="278"/>
+            <ac:spMk id="163" creationId="{201CC55D-ED54-4C5C-95E6-10947BD1103B}"/>
+          </ac:spMkLst>
+        </pc:spChg>
+        <pc:spChg chg="add del">
+          <ac:chgData name="Carolina Ramos" userId="98776216e67c81b9" providerId="LiveId" clId="{5D947E3F-F120-4B9B-814D-925CFB46FFAA}" dt="2024-05-23T09:33:54.376" v="60" actId="26606"/>
+          <ac:spMkLst>
+            <pc:docMk/>
+            <pc:sldMk cId="3000181564" sldId="278"/>
+            <ac:spMk id="165" creationId="{3873B707-463F-40B0-8227-E8CC6C67EB25}"/>
+          </ac:spMkLst>
+        </pc:spChg>
+        <pc:spChg chg="add del">
+          <ac:chgData name="Carolina Ramos" userId="98776216e67c81b9" providerId="LiveId" clId="{5D947E3F-F120-4B9B-814D-925CFB46FFAA}" dt="2024-05-23T09:33:54.376" v="60" actId="26606"/>
+          <ac:spMkLst>
+            <pc:docMk/>
+            <pc:sldMk cId="3000181564" sldId="278"/>
+            <ac:spMk id="166" creationId="{C13237C8-E62C-4F0D-A318-BD6FB6C2D138}"/>
+          </ac:spMkLst>
+        </pc:spChg>
+        <pc:spChg chg="add del">
+          <ac:chgData name="Carolina Ramos" userId="98776216e67c81b9" providerId="LiveId" clId="{5D947E3F-F120-4B9B-814D-925CFB46FFAA}" dt="2024-05-23T09:33:54.376" v="60" actId="26606"/>
+          <ac:spMkLst>
+            <pc:docMk/>
+            <pc:sldMk cId="3000181564" sldId="278"/>
+            <ac:spMk id="167" creationId="{19C9EAEA-39D0-4B0E-A0EB-51E7B26740B1}"/>
+          </ac:spMkLst>
+        </pc:spChg>
+        <pc:spChg chg="add del">
+          <ac:chgData name="Carolina Ramos" userId="98776216e67c81b9" providerId="LiveId" clId="{5D947E3F-F120-4B9B-814D-925CFB46FFAA}" dt="2024-05-23T09:33:57.099" v="62" actId="26606"/>
+          <ac:spMkLst>
+            <pc:docMk/>
+            <pc:sldMk cId="3000181564" sldId="278"/>
+            <ac:spMk id="169" creationId="{117AB3D3-3C9C-4DED-809A-78734805B895}"/>
+          </ac:spMkLst>
+        </pc:spChg>
+        <pc:spChg chg="add del">
+          <ac:chgData name="Carolina Ramos" userId="98776216e67c81b9" providerId="LiveId" clId="{5D947E3F-F120-4B9B-814D-925CFB46FFAA}" dt="2024-05-23T09:33:57.099" v="62" actId="26606"/>
+          <ac:spMkLst>
+            <pc:docMk/>
+            <pc:sldMk cId="3000181564" sldId="278"/>
+            <ac:spMk id="170" creationId="{3A9A4357-BD1D-4622-A4FE-766E6AB8DE84}"/>
+          </ac:spMkLst>
+        </pc:spChg>
+        <pc:spChg chg="add del">
+          <ac:chgData name="Carolina Ramos" userId="98776216e67c81b9" providerId="LiveId" clId="{5D947E3F-F120-4B9B-814D-925CFB46FFAA}" dt="2024-05-23T09:33:57.099" v="62" actId="26606"/>
+          <ac:spMkLst>
+            <pc:docMk/>
+            <pc:sldMk cId="3000181564" sldId="278"/>
+            <ac:spMk id="171" creationId="{E659831F-0D9A-4C63-9EBB-8435B85A440F}"/>
+          </ac:spMkLst>
+        </pc:spChg>
+        <pc:spChg chg="add del">
+          <ac:chgData name="Carolina Ramos" userId="98776216e67c81b9" providerId="LiveId" clId="{5D947E3F-F120-4B9B-814D-925CFB46FFAA}" dt="2024-05-23T09:33:57.099" v="62" actId="26606"/>
+          <ac:spMkLst>
+            <pc:docMk/>
+            <pc:sldMk cId="3000181564" sldId="278"/>
+            <ac:spMk id="172" creationId="{E6995CE5-F890-4ABA-82A2-26507CE8D2A3}"/>
+          </ac:spMkLst>
+        </pc:spChg>
+        <pc:spChg chg="add">
+          <ac:chgData name="Carolina Ramos" userId="98776216e67c81b9" providerId="LiveId" clId="{5D947E3F-F120-4B9B-814D-925CFB46FFAA}" dt="2024-05-23T09:33:57.109" v="63" actId="26606"/>
+          <ac:spMkLst>
+            <pc:docMk/>
+            <pc:sldMk cId="3000181564" sldId="278"/>
+            <ac:spMk id="174" creationId="{201CC55D-ED54-4C5C-95E6-10947BD1103B}"/>
+          </ac:spMkLst>
+        </pc:spChg>
+        <pc:spChg chg="add">
+          <ac:chgData name="Carolina Ramos" userId="98776216e67c81b9" providerId="LiveId" clId="{5D947E3F-F120-4B9B-814D-925CFB46FFAA}" dt="2024-05-23T09:33:57.109" v="63" actId="26606"/>
+          <ac:spMkLst>
+            <pc:docMk/>
+            <pc:sldMk cId="3000181564" sldId="278"/>
+            <ac:spMk id="176" creationId="{3873B707-463F-40B0-8227-E8CC6C67EB25}"/>
+          </ac:spMkLst>
+        </pc:spChg>
+        <pc:spChg chg="add">
+          <ac:chgData name="Carolina Ramos" userId="98776216e67c81b9" providerId="LiveId" clId="{5D947E3F-F120-4B9B-814D-925CFB46FFAA}" dt="2024-05-23T09:33:57.109" v="63" actId="26606"/>
+          <ac:spMkLst>
+            <pc:docMk/>
+            <pc:sldMk cId="3000181564" sldId="278"/>
+            <ac:spMk id="177" creationId="{C13237C8-E62C-4F0D-A318-BD6FB6C2D138}"/>
+          </ac:spMkLst>
+        </pc:spChg>
+        <pc:spChg chg="add">
+          <ac:chgData name="Carolina Ramos" userId="98776216e67c81b9" providerId="LiveId" clId="{5D947E3F-F120-4B9B-814D-925CFB46FFAA}" dt="2024-05-23T09:33:57.109" v="63" actId="26606"/>
+          <ac:spMkLst>
+            <pc:docMk/>
+            <pc:sldMk cId="3000181564" sldId="278"/>
+            <ac:spMk id="178" creationId="{19C9EAEA-39D0-4B0E-A0EB-51E7B26740B1}"/>
+          </ac:spMkLst>
+        </pc:spChg>
+        <pc:grpChg chg="add del">
+          <ac:chgData name="Carolina Ramos" userId="98776216e67c81b9" providerId="LiveId" clId="{5D947E3F-F120-4B9B-814D-925CFB46FFAA}" dt="2024-05-23T09:33:57.109" v="63" actId="26606"/>
+          <ac:grpSpMkLst>
+            <pc:docMk/>
+            <pc:sldMk cId="3000181564" sldId="278"/>
+            <ac:grpSpMk id="139" creationId="{1DE889C7-FAD6-4397-98E2-05D503484459}"/>
+          </ac:grpSpMkLst>
+        </pc:grpChg>
+        <pc:grpChg chg="add del">
+          <ac:chgData name="Carolina Ramos" userId="98776216e67c81b9" providerId="LiveId" clId="{5D947E3F-F120-4B9B-814D-925CFB46FFAA}" dt="2024-05-23T09:33:48.151" v="56" actId="26606"/>
+          <ac:grpSpMkLst>
+            <pc:docMk/>
+            <pc:sldMk cId="3000181564" sldId="278"/>
+            <ac:grpSpMk id="150" creationId="{1DE889C7-FAD6-4397-98E2-05D503484459}"/>
+          </ac:grpSpMkLst>
+        </pc:grpChg>
+        <pc:grpChg chg="add del">
+          <ac:chgData name="Carolina Ramos" userId="98776216e67c81b9" providerId="LiveId" clId="{5D947E3F-F120-4B9B-814D-925CFB46FFAA}" dt="2024-05-23T09:33:54.376" v="60" actId="26606"/>
+          <ac:grpSpMkLst>
+            <pc:docMk/>
+            <pc:sldMk cId="3000181564" sldId="278"/>
+            <ac:grpSpMk id="164" creationId="{1DE889C7-FAD6-4397-98E2-05D503484459}"/>
+          </ac:grpSpMkLst>
+        </pc:grpChg>
+        <pc:grpChg chg="add">
+          <ac:chgData name="Carolina Ramos" userId="98776216e67c81b9" providerId="LiveId" clId="{5D947E3F-F120-4B9B-814D-925CFB46FFAA}" dt="2024-05-23T09:33:57.109" v="63" actId="26606"/>
+          <ac:grpSpMkLst>
+            <pc:docMk/>
+            <pc:sldMk cId="3000181564" sldId="278"/>
+            <ac:grpSpMk id="175" creationId="{1DE889C7-FAD6-4397-98E2-05D503484459}"/>
+          </ac:grpSpMkLst>
+        </pc:grpChg>
+        <pc:picChg chg="mod">
+          <ac:chgData name="Carolina Ramos" userId="98776216e67c81b9" providerId="LiveId" clId="{5D947E3F-F120-4B9B-814D-925CFB46FFAA}" dt="2024-05-23T09:33:57.109" v="63" actId="26606"/>
+          <ac:picMkLst>
+            <pc:docMk/>
+            <pc:sldMk cId="3000181564" sldId="278"/>
+            <ac:picMk id="8" creationId="{127D63FC-4FED-53C4-4789-2758F2ED8C5C}"/>
+          </ac:picMkLst>
+        </pc:picChg>
+      </pc:sldChg>
+    </pc:docChg>
+  </pc:docChgLst>
+</pc:chgInfo>
 </file>
 
 <file path=ppt/slideLayouts/slideLayout1.xml><?xml version="1.0" encoding="utf-8"?>
@@ -272,7 +1050,7 @@
           <a:p>
             <a:fld id="{08868AD2-8583-410B-9C88-5A3C060D5E9C}" type="datetimeFigureOut">
               <a:rPr lang="it-IT" smtClean="0"/>
-              <a:t>20/05/2024</a:t>
+              <a:t>23/05/2024</a:t>
             </a:fld>
             <a:endParaRPr lang="it-IT"/>
           </a:p>
@@ -472,7 +1250,7 @@
           <a:p>
             <a:fld id="{08868AD2-8583-410B-9C88-5A3C060D5E9C}" type="datetimeFigureOut">
               <a:rPr lang="it-IT" smtClean="0"/>
-              <a:t>20/05/2024</a:t>
+              <a:t>23/05/2024</a:t>
             </a:fld>
             <a:endParaRPr lang="it-IT"/>
           </a:p>
@@ -682,7 +1460,7 @@
           <a:p>
             <a:fld id="{08868AD2-8583-410B-9C88-5A3C060D5E9C}" type="datetimeFigureOut">
               <a:rPr lang="it-IT" smtClean="0"/>
-              <a:t>20/05/2024</a:t>
+              <a:t>23/05/2024</a:t>
             </a:fld>
             <a:endParaRPr lang="it-IT"/>
           </a:p>
@@ -882,7 +1660,7 @@
           <a:p>
             <a:fld id="{08868AD2-8583-410B-9C88-5A3C060D5E9C}" type="datetimeFigureOut">
               <a:rPr lang="it-IT" smtClean="0"/>
-              <a:t>20/05/2024</a:t>
+              <a:t>23/05/2024</a:t>
             </a:fld>
             <a:endParaRPr lang="it-IT"/>
           </a:p>
@@ -1158,7 +1936,7 @@
           <a:p>
             <a:fld id="{08868AD2-8583-410B-9C88-5A3C060D5E9C}" type="datetimeFigureOut">
               <a:rPr lang="it-IT" smtClean="0"/>
-              <a:t>20/05/2024</a:t>
+              <a:t>23/05/2024</a:t>
             </a:fld>
             <a:endParaRPr lang="it-IT"/>
           </a:p>
@@ -1426,7 +2204,7 @@
           <a:p>
             <a:fld id="{08868AD2-8583-410B-9C88-5A3C060D5E9C}" type="datetimeFigureOut">
               <a:rPr lang="it-IT" smtClean="0"/>
-              <a:t>20/05/2024</a:t>
+              <a:t>23/05/2024</a:t>
             </a:fld>
             <a:endParaRPr lang="it-IT"/>
           </a:p>
@@ -1841,7 +2619,7 @@
           <a:p>
             <a:fld id="{08868AD2-8583-410B-9C88-5A3C060D5E9C}" type="datetimeFigureOut">
               <a:rPr lang="it-IT" smtClean="0"/>
-              <a:t>20/05/2024</a:t>
+              <a:t>23/05/2024</a:t>
             </a:fld>
             <a:endParaRPr lang="it-IT"/>
           </a:p>
@@ -1983,7 +2761,7 @@
           <a:p>
             <a:fld id="{08868AD2-8583-410B-9C88-5A3C060D5E9C}" type="datetimeFigureOut">
               <a:rPr lang="it-IT" smtClean="0"/>
-              <a:t>20/05/2024</a:t>
+              <a:t>23/05/2024</a:t>
             </a:fld>
             <a:endParaRPr lang="it-IT"/>
           </a:p>
@@ -2096,7 +2874,7 @@
           <a:p>
             <a:fld id="{08868AD2-8583-410B-9C88-5A3C060D5E9C}" type="datetimeFigureOut">
               <a:rPr lang="it-IT" smtClean="0"/>
-              <a:t>20/05/2024</a:t>
+              <a:t>23/05/2024</a:t>
             </a:fld>
             <a:endParaRPr lang="it-IT"/>
           </a:p>
@@ -2409,7 +3187,7 @@
           <a:p>
             <a:fld id="{08868AD2-8583-410B-9C88-5A3C060D5E9C}" type="datetimeFigureOut">
               <a:rPr lang="it-IT" smtClean="0"/>
-              <a:t>20/05/2024</a:t>
+              <a:t>23/05/2024</a:t>
             </a:fld>
             <a:endParaRPr lang="it-IT"/>
           </a:p>
@@ -2698,7 +3476,7 @@
           <a:p>
             <a:fld id="{08868AD2-8583-410B-9C88-5A3C060D5E9C}" type="datetimeFigureOut">
               <a:rPr lang="it-IT" smtClean="0"/>
-              <a:t>20/05/2024</a:t>
+              <a:t>23/05/2024</a:t>
             </a:fld>
             <a:endParaRPr lang="it-IT"/>
           </a:p>
@@ -2944,7 +3722,7 @@
           <a:p>
             <a:fld id="{08868AD2-8583-410B-9C88-5A3C060D5E9C}" type="datetimeFigureOut">
               <a:rPr lang="it-IT" smtClean="0"/>
-              <a:t>20/05/2024</a:t>
+              <a:t>23/05/2024</a:t>
             </a:fld>
             <a:endParaRPr lang="it-IT"/>
           </a:p>
@@ -7919,6 +8697,1127 @@
     <p:extLst>
       <p:ext uri="{BB962C8B-B14F-4D97-AF65-F5344CB8AC3E}">
         <p14:creationId xmlns:p14="http://schemas.microsoft.com/office/powerpoint/2010/main" val="2033956053"/>
+      </p:ext>
+    </p:extLst>
+  </p:cSld>
+  <p:clrMapOvr>
+    <a:masterClrMapping/>
+  </p:clrMapOvr>
+</p:sld>
+</file>
+
+<file path=ppt/slides/slide18.xml><?xml version="1.0" encoding="utf-8"?>
+<p:sld xmlns:a="http://schemas.openxmlformats.org/drawingml/2006/main" xmlns:r="http://schemas.openxmlformats.org/officeDocument/2006/relationships" xmlns:p="http://schemas.openxmlformats.org/presentationml/2006/main">
+  <p:cSld>
+    <p:bg>
+      <p:bgPr>
+        <a:solidFill>
+          <a:schemeClr val="bg1"/>
+        </a:solidFill>
+        <a:effectLst/>
+      </p:bgPr>
+    </p:bg>
+    <p:spTree>
+      <p:nvGrpSpPr>
+        <p:cNvPr id="1" name=""/>
+        <p:cNvGrpSpPr/>
+        <p:nvPr/>
+      </p:nvGrpSpPr>
+      <p:grpSpPr>
+        <a:xfrm>
+          <a:off x="0" y="0"/>
+          <a:ext cx="0" cy="0"/>
+          <a:chOff x="0" y="0"/>
+          <a:chExt cx="0" cy="0"/>
+        </a:xfrm>
+      </p:grpSpPr>
+      <p:sp useBgFill="1">
+        <p:nvSpPr>
+          <p:cNvPr id="138" name="Rectangle 137">
+            <a:extLst>
+              <a:ext uri="{FF2B5EF4-FFF2-40B4-BE49-F238E27FC236}">
+                <a16:creationId xmlns:a16="http://schemas.microsoft.com/office/drawing/2014/main" id="{201CC55D-ED54-4C5C-95E6-10947BD1103B}"/>
+              </a:ext>
+              <a:ext uri="{C183D7F6-B498-43B3-948B-1728B52AA6E4}">
+                <adec:decorative xmlns:adec="http://schemas.microsoft.com/office/drawing/2017/decorative" val="1"/>
+              </a:ext>
+            </a:extLst>
+          </p:cNvPr>
+          <p:cNvSpPr>
+            <a:spLocks noGrp="1" noRot="1" noChangeAspect="1" noMove="1" noResize="1" noEditPoints="1" noAdjustHandles="1" noChangeArrowheads="1" noChangeShapeType="1" noTextEdit="1"/>
+          </p:cNvSpPr>
+          <p:nvPr>
+            <p:extLst>
+              <p:ext uri="{386F3935-93C4-4BCD-93E2-E3B085C9AB24}">
+                <p16:designElem xmlns:p16="http://schemas.microsoft.com/office/powerpoint/2015/main" val="1"/>
+              </p:ext>
+            </p:extLst>
+          </p:nvPr>
+        </p:nvSpPr>
+        <p:spPr>
+          <a:xfrm>
+            <a:off x="0" y="0"/>
+            <a:ext cx="12191999" cy="6857365"/>
+          </a:xfrm>
+          <a:prstGeom prst="rect">
+            <a:avLst/>
+          </a:prstGeom>
+          <a:ln>
+            <a:noFill/>
+          </a:ln>
+        </p:spPr>
+        <p:style>
+          <a:lnRef idx="2">
+            <a:schemeClr val="accent1">
+              <a:shade val="50000"/>
+            </a:schemeClr>
+          </a:lnRef>
+          <a:fillRef idx="1">
+            <a:schemeClr val="accent1"/>
+          </a:fillRef>
+          <a:effectRef idx="0">
+            <a:schemeClr val="accent1"/>
+          </a:effectRef>
+          <a:fontRef idx="minor">
+            <a:schemeClr val="lt1"/>
+          </a:fontRef>
+        </p:style>
+        <p:txBody>
+          <a:bodyPr rtlCol="0" anchor="ctr"/>
+          <a:lstStyle/>
+          <a:p>
+            <a:pPr algn="ctr"/>
+            <a:endParaRPr lang="en-US"/>
+          </a:p>
+        </p:txBody>
+      </p:sp>
+      <p:sp>
+        <p:nvSpPr>
+          <p:cNvPr id="2" name="Title 1">
+            <a:extLst>
+              <a:ext uri="{FF2B5EF4-FFF2-40B4-BE49-F238E27FC236}">
+                <a16:creationId xmlns:a16="http://schemas.microsoft.com/office/drawing/2014/main" id="{B51CFE8A-C6E6-5D02-538D-A6CB3DDAE7CD}"/>
+              </a:ext>
+            </a:extLst>
+          </p:cNvPr>
+          <p:cNvSpPr>
+            <a:spLocks noGrp="1"/>
+          </p:cNvSpPr>
+          <p:nvPr>
+            <p:ph type="title"/>
+          </p:nvPr>
+        </p:nvSpPr>
+        <p:spPr>
+          <a:xfrm>
+            <a:off x="589560" y="856180"/>
+            <a:ext cx="4560584" cy="1128068"/>
+          </a:xfrm>
+        </p:spPr>
+        <p:txBody>
+          <a:bodyPr vert="horz" lIns="91440" tIns="45720" rIns="91440" bIns="45720" rtlCol="0" anchor="ctr">
+            <a:normAutofit/>
+          </a:bodyPr>
+          <a:lstStyle/>
+          <a:p>
+            <a:r>
+              <a:rPr lang="en-US" sz="4000" b="1">
+                <a:effectLst/>
+              </a:rPr>
+              <a:t>Conclusion</a:t>
+            </a:r>
+            <a:endParaRPr lang="en-US" sz="4000" b="1"/>
+          </a:p>
+        </p:txBody>
+      </p:sp>
+      <p:grpSp>
+        <p:nvGrpSpPr>
+          <p:cNvPr id="139" name="Group 138">
+            <a:extLst>
+              <a:ext uri="{FF2B5EF4-FFF2-40B4-BE49-F238E27FC236}">
+                <a16:creationId xmlns:a16="http://schemas.microsoft.com/office/drawing/2014/main" id="{1DE889C7-FAD6-4397-98E2-05D503484459}"/>
+              </a:ext>
+              <a:ext uri="{C183D7F6-B498-43B3-948B-1728B52AA6E4}">
+                <adec:decorative xmlns:adec="http://schemas.microsoft.com/office/drawing/2017/decorative" val="1"/>
+              </a:ext>
+            </a:extLst>
+          </p:cNvPr>
+          <p:cNvGrpSpPr>
+            <a:grpSpLocks noGrp="1" noUngrp="1" noRot="1" noChangeAspect="1" noMove="1" noResize="1"/>
+          </p:cNvGrpSpPr>
+          <p:nvPr>
+            <p:extLst>
+              <p:ext uri="{386F3935-93C4-4BCD-93E2-E3B085C9AB24}">
+                <p16:designElem xmlns:p16="http://schemas.microsoft.com/office/powerpoint/2015/main" val="1"/>
+              </p:ext>
+            </p:extLst>
+          </p:nvPr>
+        </p:nvGrpSpPr>
+        <p:grpSpPr>
+          <a:xfrm>
+            <a:off x="0" y="1083484"/>
+            <a:ext cx="355196" cy="673460"/>
+            <a:chOff x="0" y="823811"/>
+            <a:chExt cx="355196" cy="673460"/>
+          </a:xfrm>
+        </p:grpSpPr>
+        <p:sp>
+          <p:nvSpPr>
+            <p:cNvPr id="75" name="Rectangle 74">
+              <a:extLst>
+                <a:ext uri="{FF2B5EF4-FFF2-40B4-BE49-F238E27FC236}">
+                  <a16:creationId xmlns:a16="http://schemas.microsoft.com/office/drawing/2014/main" id="{F399A70F-F8CD-4992-9EF5-6CF15472E73F}"/>
+                </a:ext>
+                <a:ext uri="{C183D7F6-B498-43B3-948B-1728B52AA6E4}">
+                  <adec:decorative xmlns:adec="http://schemas.microsoft.com/office/drawing/2017/decorative" val="1"/>
+                </a:ext>
+              </a:extLst>
+            </p:cNvPr>
+            <p:cNvSpPr/>
+            <p:nvPr>
+              <p:extLst>
+                <p:ext uri="{386F3935-93C4-4BCD-93E2-E3B085C9AB24}">
+                  <p16:designElem xmlns:p16="http://schemas.microsoft.com/office/powerpoint/2015/main" val="1"/>
+                </p:ext>
+              </p:extLst>
+            </p:nvPr>
+          </p:nvSpPr>
+          <p:spPr>
+            <a:xfrm>
+              <a:off x="0" y="823811"/>
+              <a:ext cx="87363" cy="673460"/>
+            </a:xfrm>
+            <a:prstGeom prst="rect">
+              <a:avLst/>
+            </a:prstGeom>
+            <a:solidFill>
+              <a:schemeClr val="accent4"/>
+            </a:solidFill>
+            <a:ln>
+              <a:noFill/>
+            </a:ln>
+          </p:spPr>
+          <p:style>
+            <a:lnRef idx="2">
+              <a:schemeClr val="accent1">
+                <a:shade val="50000"/>
+              </a:schemeClr>
+            </a:lnRef>
+            <a:fillRef idx="1">
+              <a:schemeClr val="accent1"/>
+            </a:fillRef>
+            <a:effectRef idx="0">
+              <a:schemeClr val="accent1"/>
+            </a:effectRef>
+            <a:fontRef idx="minor">
+              <a:schemeClr val="lt1"/>
+            </a:fontRef>
+          </p:style>
+          <p:txBody>
+            <a:bodyPr rtlCol="0" anchor="ctr"/>
+            <a:lstStyle/>
+            <a:p>
+              <a:pPr algn="ctr"/>
+              <a:endParaRPr lang="en-US"/>
+            </a:p>
+          </p:txBody>
+        </p:sp>
+        <p:sp>
+          <p:nvSpPr>
+            <p:cNvPr id="140" name="Rectangle 139">
+              <a:extLst>
+                <a:ext uri="{FF2B5EF4-FFF2-40B4-BE49-F238E27FC236}">
+                  <a16:creationId xmlns:a16="http://schemas.microsoft.com/office/drawing/2014/main" id="{48F4FEDC-6D80-458C-A665-075D9B9500FD}"/>
+                </a:ext>
+                <a:ext uri="{C183D7F6-B498-43B3-948B-1728B52AA6E4}">
+                  <adec:decorative xmlns:adec="http://schemas.microsoft.com/office/drawing/2017/decorative" val="1"/>
+                </a:ext>
+              </a:extLst>
+            </p:cNvPr>
+            <p:cNvSpPr/>
+            <p:nvPr>
+              <p:extLst>
+                <p:ext uri="{386F3935-93C4-4BCD-93E2-E3B085C9AB24}">
+                  <p16:designElem xmlns:p16="http://schemas.microsoft.com/office/powerpoint/2015/main" val="1"/>
+                </p:ext>
+              </p:extLst>
+            </p:nvPr>
+          </p:nvSpPr>
+          <p:spPr>
+            <a:xfrm>
+              <a:off x="159341" y="823811"/>
+              <a:ext cx="195855" cy="673460"/>
+            </a:xfrm>
+            <a:prstGeom prst="rect">
+              <a:avLst/>
+            </a:prstGeom>
+            <a:solidFill>
+              <a:schemeClr val="accent4"/>
+            </a:solidFill>
+            <a:ln>
+              <a:noFill/>
+            </a:ln>
+          </p:spPr>
+          <p:style>
+            <a:lnRef idx="2">
+              <a:schemeClr val="accent1">
+                <a:shade val="50000"/>
+              </a:schemeClr>
+            </a:lnRef>
+            <a:fillRef idx="1">
+              <a:schemeClr val="accent1"/>
+            </a:fillRef>
+            <a:effectRef idx="0">
+              <a:schemeClr val="accent1"/>
+            </a:effectRef>
+            <a:fontRef idx="minor">
+              <a:schemeClr val="lt1"/>
+            </a:fontRef>
+          </p:style>
+          <p:txBody>
+            <a:bodyPr rtlCol="0" anchor="ctr"/>
+            <a:lstStyle/>
+            <a:p>
+              <a:pPr algn="ctr"/>
+              <a:endParaRPr lang="en-US"/>
+            </a:p>
+          </p:txBody>
+        </p:sp>
+      </p:grpSp>
+      <p:sp>
+        <p:nvSpPr>
+          <p:cNvPr id="141" name="Rectangle 140">
+            <a:extLst>
+              <a:ext uri="{FF2B5EF4-FFF2-40B4-BE49-F238E27FC236}">
+                <a16:creationId xmlns:a16="http://schemas.microsoft.com/office/drawing/2014/main" id="{3873B707-463F-40B0-8227-E8CC6C67EB25}"/>
+              </a:ext>
+              <a:ext uri="{C183D7F6-B498-43B3-948B-1728B52AA6E4}">
+                <adec:decorative xmlns:adec="http://schemas.microsoft.com/office/drawing/2017/decorative" val="1"/>
+              </a:ext>
+            </a:extLst>
+          </p:cNvPr>
+          <p:cNvSpPr>
+            <a:spLocks noGrp="1" noRot="1" noChangeAspect="1" noMove="1" noResize="1" noEditPoints="1" noAdjustHandles="1" noChangeArrowheads="1" noChangeShapeType="1" noTextEdit="1"/>
+          </p:cNvSpPr>
+          <p:nvPr>
+            <p:extLst>
+              <p:ext uri="{386F3935-93C4-4BCD-93E2-E3B085C9AB24}">
+                <p16:designElem xmlns:p16="http://schemas.microsoft.com/office/powerpoint/2015/main" val="1"/>
+              </p:ext>
+            </p:extLst>
+          </p:nvPr>
+        </p:nvSpPr>
+        <p:spPr>
+          <a:xfrm flipH="1">
+            <a:off x="665085" y="2090569"/>
+            <a:ext cx="4297680" cy="27432"/>
+          </a:xfrm>
+          <a:prstGeom prst="rect">
+            <a:avLst/>
+          </a:prstGeom>
+          <a:solidFill>
+            <a:schemeClr val="accent4"/>
+          </a:solidFill>
+          <a:ln>
+            <a:noFill/>
+          </a:ln>
+        </p:spPr>
+        <p:style>
+          <a:lnRef idx="2">
+            <a:schemeClr val="accent1">
+              <a:shade val="50000"/>
+            </a:schemeClr>
+          </a:lnRef>
+          <a:fillRef idx="1">
+            <a:schemeClr val="accent1"/>
+          </a:fillRef>
+          <a:effectRef idx="0">
+            <a:schemeClr val="accent1"/>
+          </a:effectRef>
+          <a:fontRef idx="minor">
+            <a:schemeClr val="lt1"/>
+          </a:fontRef>
+        </p:style>
+        <p:txBody>
+          <a:bodyPr rtlCol="0" anchor="ctr"/>
+          <a:lstStyle/>
+          <a:p>
+            <a:pPr algn="ctr"/>
+            <a:endParaRPr lang="en-US"/>
+          </a:p>
+        </p:txBody>
+      </p:sp>
+      <p:sp>
+        <p:nvSpPr>
+          <p:cNvPr id="4" name="Text Placeholder 3">
+            <a:extLst>
+              <a:ext uri="{FF2B5EF4-FFF2-40B4-BE49-F238E27FC236}">
+                <a16:creationId xmlns:a16="http://schemas.microsoft.com/office/drawing/2014/main" id="{131B2A30-C07F-2F8B-04B1-B74B879342CE}"/>
+              </a:ext>
+            </a:extLst>
+          </p:cNvPr>
+          <p:cNvSpPr>
+            <a:spLocks noGrp="1"/>
+          </p:cNvSpPr>
+          <p:nvPr>
+            <p:ph type="body" sz="half" idx="2"/>
+          </p:nvPr>
+        </p:nvSpPr>
+        <p:spPr>
+          <a:xfrm>
+            <a:off x="590719" y="2330505"/>
+            <a:ext cx="4559425" cy="3979585"/>
+          </a:xfrm>
+        </p:spPr>
+        <p:txBody>
+          <a:bodyPr vert="horz" lIns="91440" tIns="45720" rIns="91440" bIns="45720" rtlCol="0" anchor="ctr">
+            <a:normAutofit/>
+          </a:bodyPr>
+          <a:lstStyle/>
+          <a:p>
+            <a:pPr indent="-228600">
+              <a:buFont typeface="Arial" panose="020B0604020202020204" pitchFamily="34" charset="0"/>
+              <a:buChar char="•"/>
+            </a:pPr>
+            <a:r>
+              <a:rPr lang="en-US" sz="1400" dirty="0"/>
+              <a:t>The initial logistic regression model achieved an accuracy of 62% but struggled with precision and recall for "rejected" loans. In contrast, the Gradient Boosting Classifier significantly improved accuracy to 98%, demonstrating high precision and recall for both approved and rejected loans. Similarly, Decision Tree and Random Forest models also reached 98% accuracy, indicating their robustness with this dataset. These findings suggest that Gradient Boosting and Random Forest models can be reliable tools for predicting loan approvals, potentially reducing the risk of approving high-risk loans. Automating the loan approval process with these models can streamline operations, reduce manual workload, and speed up decision-making for financial institutions. Furthermore, these data-driven models can ensure consistent decision-making, potentially reducing biases present in manual approval processes.</a:t>
+            </a:r>
+          </a:p>
+        </p:txBody>
+      </p:sp>
+      <p:sp>
+        <p:nvSpPr>
+          <p:cNvPr id="142" name="Rectangle 141">
+            <a:extLst>
+              <a:ext uri="{FF2B5EF4-FFF2-40B4-BE49-F238E27FC236}">
+                <a16:creationId xmlns:a16="http://schemas.microsoft.com/office/drawing/2014/main" id="{C13237C8-E62C-4F0D-A318-BD6FB6C2D138}"/>
+              </a:ext>
+              <a:ext uri="{C183D7F6-B498-43B3-948B-1728B52AA6E4}">
+                <adec:decorative xmlns:adec="http://schemas.microsoft.com/office/drawing/2017/decorative" val="1"/>
+              </a:ext>
+            </a:extLst>
+          </p:cNvPr>
+          <p:cNvSpPr>
+            <a:spLocks noGrp="1" noRot="1" noChangeAspect="1" noMove="1" noResize="1" noEditPoints="1" noAdjustHandles="1" noChangeArrowheads="1" noChangeShapeType="1" noTextEdit="1"/>
+          </p:cNvSpPr>
+          <p:nvPr>
+            <p:extLst>
+              <p:ext uri="{386F3935-93C4-4BCD-93E2-E3B085C9AB24}">
+                <p16:designElem xmlns:p16="http://schemas.microsoft.com/office/powerpoint/2015/main" val="1"/>
+              </p:ext>
+            </p:extLst>
+          </p:nvPr>
+        </p:nvSpPr>
+        <p:spPr>
+          <a:xfrm flipH="1">
+            <a:off x="10697670" y="0"/>
+            <a:ext cx="1494330" cy="6858000"/>
+          </a:xfrm>
+          <a:prstGeom prst="rect">
+            <a:avLst/>
+          </a:prstGeom>
+          <a:solidFill>
+            <a:schemeClr val="accent4"/>
+          </a:solidFill>
+          <a:ln>
+            <a:noFill/>
+          </a:ln>
+        </p:spPr>
+        <p:style>
+          <a:lnRef idx="2">
+            <a:schemeClr val="accent1">
+              <a:shade val="50000"/>
+            </a:schemeClr>
+          </a:lnRef>
+          <a:fillRef idx="1">
+            <a:schemeClr val="accent1"/>
+          </a:fillRef>
+          <a:effectRef idx="0">
+            <a:schemeClr val="accent1"/>
+          </a:effectRef>
+          <a:fontRef idx="minor">
+            <a:schemeClr val="lt1"/>
+          </a:fontRef>
+        </p:style>
+        <p:txBody>
+          <a:bodyPr rtlCol="0" anchor="ctr"/>
+          <a:lstStyle/>
+          <a:p>
+            <a:pPr algn="ctr"/>
+            <a:endParaRPr lang="en-US"/>
+          </a:p>
+        </p:txBody>
+      </p:sp>
+      <p:sp>
+        <p:nvSpPr>
+          <p:cNvPr id="143" name="Rectangle 142">
+            <a:extLst>
+              <a:ext uri="{FF2B5EF4-FFF2-40B4-BE49-F238E27FC236}">
+                <a16:creationId xmlns:a16="http://schemas.microsoft.com/office/drawing/2014/main" id="{19C9EAEA-39D0-4B0E-A0EB-51E7B26740B1}"/>
+              </a:ext>
+              <a:ext uri="{C183D7F6-B498-43B3-948B-1728B52AA6E4}">
+                <adec:decorative xmlns:adec="http://schemas.microsoft.com/office/drawing/2017/decorative" val="1"/>
+              </a:ext>
+            </a:extLst>
+          </p:cNvPr>
+          <p:cNvSpPr>
+            <a:spLocks noGrp="1" noRot="1" noChangeAspect="1" noMove="1" noResize="1" noEditPoints="1" noAdjustHandles="1" noChangeArrowheads="1" noChangeShapeType="1" noTextEdit="1"/>
+          </p:cNvSpPr>
+          <p:nvPr>
+            <p:extLst>
+              <p:ext uri="{386F3935-93C4-4BCD-93E2-E3B085C9AB24}">
+                <p16:designElem xmlns:p16="http://schemas.microsoft.com/office/powerpoint/2015/main" val="1"/>
+              </p:ext>
+            </p:extLst>
+          </p:nvPr>
+        </p:nvSpPr>
+        <p:spPr>
+          <a:xfrm>
+            <a:off x="5685810" y="513853"/>
+            <a:ext cx="6009366" cy="5834577"/>
+          </a:xfrm>
+          <a:prstGeom prst="rect">
+            <a:avLst/>
+          </a:prstGeom>
+          <a:solidFill>
+            <a:schemeClr val="bg1"/>
+          </a:solidFill>
+          <a:ln>
+            <a:noFill/>
+          </a:ln>
+          <a:effectLst>
+            <a:outerShdw blurRad="139700" dist="127000" dir="5400000" algn="t" rotWithShape="0">
+              <a:prstClr val="black">
+                <a:alpha val="15000"/>
+              </a:prstClr>
+            </a:outerShdw>
+          </a:effectLst>
+        </p:spPr>
+        <p:style>
+          <a:lnRef idx="2">
+            <a:schemeClr val="accent1">
+              <a:shade val="50000"/>
+            </a:schemeClr>
+          </a:lnRef>
+          <a:fillRef idx="1">
+            <a:schemeClr val="accent1"/>
+          </a:fillRef>
+          <a:effectRef idx="0">
+            <a:schemeClr val="accent1"/>
+          </a:effectRef>
+          <a:fontRef idx="minor">
+            <a:schemeClr val="lt1"/>
+          </a:fontRef>
+        </p:style>
+        <p:txBody>
+          <a:bodyPr rtlCol="0" anchor="ctr"/>
+          <a:lstStyle/>
+          <a:p>
+            <a:pPr algn="ctr"/>
+            <a:endParaRPr lang="en-US"/>
+          </a:p>
+        </p:txBody>
+      </p:sp>
+      <p:pic>
+        <p:nvPicPr>
+          <p:cNvPr id="8" name="Content Placeholder 7">
+            <a:extLst>
+              <a:ext uri="{FF2B5EF4-FFF2-40B4-BE49-F238E27FC236}">
+                <a16:creationId xmlns:a16="http://schemas.microsoft.com/office/drawing/2014/main" id="{127D63FC-4FED-53C4-4789-2758F2ED8C5C}"/>
+              </a:ext>
+            </a:extLst>
+          </p:cNvPr>
+          <p:cNvPicPr>
+            <a:picLocks noGrp="1" noChangeAspect="1"/>
+          </p:cNvPicPr>
+          <p:nvPr>
+            <p:ph idx="1"/>
+          </p:nvPr>
+        </p:nvPicPr>
+        <p:blipFill rotWithShape="1">
+          <a:blip r:embed="rId2">
+            <a:extLst>
+              <a:ext uri="{28A0092B-C50C-407E-A947-70E740481C1C}">
+                <a14:useLocalDpi xmlns:a14="http://schemas.microsoft.com/office/drawing/2010/main" val="0"/>
+              </a:ext>
+            </a:extLst>
+          </a:blip>
+          <a:srcRect l="12319" r="19033" b="-1"/>
+          <a:stretch/>
+        </p:blipFill>
+        <p:spPr>
+          <a:xfrm>
+            <a:off x="5977788" y="799352"/>
+            <a:ext cx="5425410" cy="5259296"/>
+          </a:xfrm>
+          <a:prstGeom prst="rect">
+            <a:avLst/>
+          </a:prstGeom>
+        </p:spPr>
+      </p:pic>
+    </p:spTree>
+    <p:extLst>
+      <p:ext uri="{BB962C8B-B14F-4D97-AF65-F5344CB8AC3E}">
+        <p14:creationId xmlns:p14="http://schemas.microsoft.com/office/powerpoint/2010/main" val="1270773856"/>
+      </p:ext>
+    </p:extLst>
+  </p:cSld>
+  <p:clrMapOvr>
+    <a:masterClrMapping/>
+  </p:clrMapOvr>
+</p:sld>
+</file>
+
+<file path=ppt/slides/slide19.xml><?xml version="1.0" encoding="utf-8"?>
+<p:sld xmlns:a="http://schemas.openxmlformats.org/drawingml/2006/main" xmlns:r="http://schemas.openxmlformats.org/officeDocument/2006/relationships" xmlns:p="http://schemas.openxmlformats.org/presentationml/2006/main">
+  <p:cSld>
+    <p:bg>
+      <p:bgPr>
+        <a:solidFill>
+          <a:schemeClr val="bg1"/>
+        </a:solidFill>
+        <a:effectLst/>
+      </p:bgPr>
+    </p:bg>
+    <p:spTree>
+      <p:nvGrpSpPr>
+        <p:cNvPr id="1" name=""/>
+        <p:cNvGrpSpPr/>
+        <p:nvPr/>
+      </p:nvGrpSpPr>
+      <p:grpSpPr>
+        <a:xfrm>
+          <a:off x="0" y="0"/>
+          <a:ext cx="0" cy="0"/>
+          <a:chOff x="0" y="0"/>
+          <a:chExt cx="0" cy="0"/>
+        </a:xfrm>
+      </p:grpSpPr>
+      <p:sp useBgFill="1">
+        <p:nvSpPr>
+          <p:cNvPr id="174" name="Rectangle 173">
+            <a:extLst>
+              <a:ext uri="{FF2B5EF4-FFF2-40B4-BE49-F238E27FC236}">
+                <a16:creationId xmlns:a16="http://schemas.microsoft.com/office/drawing/2014/main" id="{201CC55D-ED54-4C5C-95E6-10947BD1103B}"/>
+              </a:ext>
+              <a:ext uri="{C183D7F6-B498-43B3-948B-1728B52AA6E4}">
+                <adec:decorative xmlns:adec="http://schemas.microsoft.com/office/drawing/2017/decorative" val="1"/>
+              </a:ext>
+            </a:extLst>
+          </p:cNvPr>
+          <p:cNvSpPr>
+            <a:spLocks noGrp="1" noRot="1" noChangeAspect="1" noMove="1" noResize="1" noEditPoints="1" noAdjustHandles="1" noChangeArrowheads="1" noChangeShapeType="1" noTextEdit="1"/>
+          </p:cNvSpPr>
+          <p:nvPr>
+            <p:extLst>
+              <p:ext uri="{386F3935-93C4-4BCD-93E2-E3B085C9AB24}">
+                <p16:designElem xmlns:p16="http://schemas.microsoft.com/office/powerpoint/2015/main" val="1"/>
+              </p:ext>
+            </p:extLst>
+          </p:nvPr>
+        </p:nvSpPr>
+        <p:spPr>
+          <a:xfrm>
+            <a:off x="0" y="0"/>
+            <a:ext cx="12191999" cy="6857365"/>
+          </a:xfrm>
+          <a:prstGeom prst="rect">
+            <a:avLst/>
+          </a:prstGeom>
+          <a:ln>
+            <a:noFill/>
+          </a:ln>
+        </p:spPr>
+        <p:style>
+          <a:lnRef idx="2">
+            <a:schemeClr val="accent1">
+              <a:shade val="50000"/>
+            </a:schemeClr>
+          </a:lnRef>
+          <a:fillRef idx="1">
+            <a:schemeClr val="accent1"/>
+          </a:fillRef>
+          <a:effectRef idx="0">
+            <a:schemeClr val="accent1"/>
+          </a:effectRef>
+          <a:fontRef idx="minor">
+            <a:schemeClr val="lt1"/>
+          </a:fontRef>
+        </p:style>
+        <p:txBody>
+          <a:bodyPr rtlCol="0" anchor="ctr"/>
+          <a:lstStyle/>
+          <a:p>
+            <a:pPr algn="ctr"/>
+            <a:endParaRPr lang="en-US"/>
+          </a:p>
+        </p:txBody>
+      </p:sp>
+      <p:sp>
+        <p:nvSpPr>
+          <p:cNvPr id="2" name="Title 1">
+            <a:extLst>
+              <a:ext uri="{FF2B5EF4-FFF2-40B4-BE49-F238E27FC236}">
+                <a16:creationId xmlns:a16="http://schemas.microsoft.com/office/drawing/2014/main" id="{B51CFE8A-C6E6-5D02-538D-A6CB3DDAE7CD}"/>
+              </a:ext>
+            </a:extLst>
+          </p:cNvPr>
+          <p:cNvSpPr>
+            <a:spLocks noGrp="1"/>
+          </p:cNvSpPr>
+          <p:nvPr>
+            <p:ph type="title"/>
+          </p:nvPr>
+        </p:nvSpPr>
+        <p:spPr>
+          <a:xfrm>
+            <a:off x="589560" y="856180"/>
+            <a:ext cx="4560584" cy="1128068"/>
+          </a:xfrm>
+        </p:spPr>
+        <p:txBody>
+          <a:bodyPr vert="horz" lIns="91440" tIns="45720" rIns="91440" bIns="45720" rtlCol="0" anchor="ctr">
+            <a:normAutofit/>
+          </a:bodyPr>
+          <a:lstStyle/>
+          <a:p>
+            <a:r>
+              <a:rPr lang="en-US" sz="4000" b="1" dirty="0">
+                <a:effectLst/>
+              </a:rPr>
+              <a:t>In the Future</a:t>
+            </a:r>
+            <a:endParaRPr lang="en-US" sz="4000" b="1" dirty="0"/>
+          </a:p>
+        </p:txBody>
+      </p:sp>
+      <p:grpSp>
+        <p:nvGrpSpPr>
+          <p:cNvPr id="175" name="Group 174">
+            <a:extLst>
+              <a:ext uri="{FF2B5EF4-FFF2-40B4-BE49-F238E27FC236}">
+                <a16:creationId xmlns:a16="http://schemas.microsoft.com/office/drawing/2014/main" id="{1DE889C7-FAD6-4397-98E2-05D503484459}"/>
+              </a:ext>
+              <a:ext uri="{C183D7F6-B498-43B3-948B-1728B52AA6E4}">
+                <adec:decorative xmlns:adec="http://schemas.microsoft.com/office/drawing/2017/decorative" val="1"/>
+              </a:ext>
+            </a:extLst>
+          </p:cNvPr>
+          <p:cNvGrpSpPr>
+            <a:grpSpLocks noGrp="1" noUngrp="1" noRot="1" noChangeAspect="1" noMove="1" noResize="1"/>
+          </p:cNvGrpSpPr>
+          <p:nvPr>
+            <p:extLst>
+              <p:ext uri="{386F3935-93C4-4BCD-93E2-E3B085C9AB24}">
+                <p16:designElem xmlns:p16="http://schemas.microsoft.com/office/powerpoint/2015/main" val="1"/>
+              </p:ext>
+            </p:extLst>
+          </p:nvPr>
+        </p:nvGrpSpPr>
+        <p:grpSpPr>
+          <a:xfrm>
+            <a:off x="0" y="1083484"/>
+            <a:ext cx="355196" cy="673460"/>
+            <a:chOff x="0" y="823811"/>
+            <a:chExt cx="355196" cy="673460"/>
+          </a:xfrm>
+        </p:grpSpPr>
+        <p:sp>
+          <p:nvSpPr>
+            <p:cNvPr id="151" name="Rectangle 150">
+              <a:extLst>
+                <a:ext uri="{FF2B5EF4-FFF2-40B4-BE49-F238E27FC236}">
+                  <a16:creationId xmlns:a16="http://schemas.microsoft.com/office/drawing/2014/main" id="{F399A70F-F8CD-4992-9EF5-6CF15472E73F}"/>
+                </a:ext>
+                <a:ext uri="{C183D7F6-B498-43B3-948B-1728B52AA6E4}">
+                  <adec:decorative xmlns:adec="http://schemas.microsoft.com/office/drawing/2017/decorative" val="1"/>
+                </a:ext>
+              </a:extLst>
+            </p:cNvPr>
+            <p:cNvSpPr/>
+            <p:nvPr>
+              <p:extLst>
+                <p:ext uri="{386F3935-93C4-4BCD-93E2-E3B085C9AB24}">
+                  <p16:designElem xmlns:p16="http://schemas.microsoft.com/office/powerpoint/2015/main" val="1"/>
+                </p:ext>
+              </p:extLst>
+            </p:nvPr>
+          </p:nvSpPr>
+          <p:spPr>
+            <a:xfrm>
+              <a:off x="0" y="823811"/>
+              <a:ext cx="87363" cy="673460"/>
+            </a:xfrm>
+            <a:prstGeom prst="rect">
+              <a:avLst/>
+            </a:prstGeom>
+            <a:solidFill>
+              <a:schemeClr val="accent4"/>
+            </a:solidFill>
+            <a:ln>
+              <a:noFill/>
+            </a:ln>
+          </p:spPr>
+          <p:style>
+            <a:lnRef idx="2">
+              <a:schemeClr val="accent1">
+                <a:shade val="50000"/>
+              </a:schemeClr>
+            </a:lnRef>
+            <a:fillRef idx="1">
+              <a:schemeClr val="accent1"/>
+            </a:fillRef>
+            <a:effectRef idx="0">
+              <a:schemeClr val="accent1"/>
+            </a:effectRef>
+            <a:fontRef idx="minor">
+              <a:schemeClr val="lt1"/>
+            </a:fontRef>
+          </p:style>
+          <p:txBody>
+            <a:bodyPr rtlCol="0" anchor="ctr"/>
+            <a:lstStyle/>
+            <a:p>
+              <a:pPr algn="ctr"/>
+              <a:endParaRPr lang="en-US"/>
+            </a:p>
+          </p:txBody>
+        </p:sp>
+        <p:sp>
+          <p:nvSpPr>
+            <p:cNvPr id="152" name="Rectangle 151">
+              <a:extLst>
+                <a:ext uri="{FF2B5EF4-FFF2-40B4-BE49-F238E27FC236}">
+                  <a16:creationId xmlns:a16="http://schemas.microsoft.com/office/drawing/2014/main" id="{48F4FEDC-6D80-458C-A665-075D9B9500FD}"/>
+                </a:ext>
+                <a:ext uri="{C183D7F6-B498-43B3-948B-1728B52AA6E4}">
+                  <adec:decorative xmlns:adec="http://schemas.microsoft.com/office/drawing/2017/decorative" val="1"/>
+                </a:ext>
+              </a:extLst>
+            </p:cNvPr>
+            <p:cNvSpPr/>
+            <p:nvPr>
+              <p:extLst>
+                <p:ext uri="{386F3935-93C4-4BCD-93E2-E3B085C9AB24}">
+                  <p16:designElem xmlns:p16="http://schemas.microsoft.com/office/powerpoint/2015/main" val="1"/>
+                </p:ext>
+              </p:extLst>
+            </p:nvPr>
+          </p:nvSpPr>
+          <p:spPr>
+            <a:xfrm>
+              <a:off x="159341" y="823811"/>
+              <a:ext cx="195855" cy="673460"/>
+            </a:xfrm>
+            <a:prstGeom prst="rect">
+              <a:avLst/>
+            </a:prstGeom>
+            <a:solidFill>
+              <a:schemeClr val="accent4"/>
+            </a:solidFill>
+            <a:ln>
+              <a:noFill/>
+            </a:ln>
+          </p:spPr>
+          <p:style>
+            <a:lnRef idx="2">
+              <a:schemeClr val="accent1">
+                <a:shade val="50000"/>
+              </a:schemeClr>
+            </a:lnRef>
+            <a:fillRef idx="1">
+              <a:schemeClr val="accent1"/>
+            </a:fillRef>
+            <a:effectRef idx="0">
+              <a:schemeClr val="accent1"/>
+            </a:effectRef>
+            <a:fontRef idx="minor">
+              <a:schemeClr val="lt1"/>
+            </a:fontRef>
+          </p:style>
+          <p:txBody>
+            <a:bodyPr rtlCol="0" anchor="ctr"/>
+            <a:lstStyle/>
+            <a:p>
+              <a:pPr algn="ctr"/>
+              <a:endParaRPr lang="en-US"/>
+            </a:p>
+          </p:txBody>
+        </p:sp>
+      </p:grpSp>
+      <p:sp>
+        <p:nvSpPr>
+          <p:cNvPr id="176" name="Rectangle 175">
+            <a:extLst>
+              <a:ext uri="{FF2B5EF4-FFF2-40B4-BE49-F238E27FC236}">
+                <a16:creationId xmlns:a16="http://schemas.microsoft.com/office/drawing/2014/main" id="{3873B707-463F-40B0-8227-E8CC6C67EB25}"/>
+              </a:ext>
+              <a:ext uri="{C183D7F6-B498-43B3-948B-1728B52AA6E4}">
+                <adec:decorative xmlns:adec="http://schemas.microsoft.com/office/drawing/2017/decorative" val="1"/>
+              </a:ext>
+            </a:extLst>
+          </p:cNvPr>
+          <p:cNvSpPr>
+            <a:spLocks noGrp="1" noRot="1" noChangeAspect="1" noMove="1" noResize="1" noEditPoints="1" noAdjustHandles="1" noChangeArrowheads="1" noChangeShapeType="1" noTextEdit="1"/>
+          </p:cNvSpPr>
+          <p:nvPr>
+            <p:extLst>
+              <p:ext uri="{386F3935-93C4-4BCD-93E2-E3B085C9AB24}">
+                <p16:designElem xmlns:p16="http://schemas.microsoft.com/office/powerpoint/2015/main" val="1"/>
+              </p:ext>
+            </p:extLst>
+          </p:nvPr>
+        </p:nvSpPr>
+        <p:spPr>
+          <a:xfrm flipH="1">
+            <a:off x="665085" y="2090569"/>
+            <a:ext cx="4297680" cy="27432"/>
+          </a:xfrm>
+          <a:prstGeom prst="rect">
+            <a:avLst/>
+          </a:prstGeom>
+          <a:solidFill>
+            <a:schemeClr val="accent4"/>
+          </a:solidFill>
+          <a:ln>
+            <a:noFill/>
+          </a:ln>
+        </p:spPr>
+        <p:style>
+          <a:lnRef idx="2">
+            <a:schemeClr val="accent1">
+              <a:shade val="50000"/>
+            </a:schemeClr>
+          </a:lnRef>
+          <a:fillRef idx="1">
+            <a:schemeClr val="accent1"/>
+          </a:fillRef>
+          <a:effectRef idx="0">
+            <a:schemeClr val="accent1"/>
+          </a:effectRef>
+          <a:fontRef idx="minor">
+            <a:schemeClr val="lt1"/>
+          </a:fontRef>
+        </p:style>
+        <p:txBody>
+          <a:bodyPr rtlCol="0" anchor="ctr"/>
+          <a:lstStyle/>
+          <a:p>
+            <a:pPr algn="ctr"/>
+            <a:endParaRPr lang="en-US"/>
+          </a:p>
+        </p:txBody>
+      </p:sp>
+      <p:sp>
+        <p:nvSpPr>
+          <p:cNvPr id="4" name="Text Placeholder 3">
+            <a:extLst>
+              <a:ext uri="{FF2B5EF4-FFF2-40B4-BE49-F238E27FC236}">
+                <a16:creationId xmlns:a16="http://schemas.microsoft.com/office/drawing/2014/main" id="{131B2A30-C07F-2F8B-04B1-B74B879342CE}"/>
+              </a:ext>
+            </a:extLst>
+          </p:cNvPr>
+          <p:cNvSpPr>
+            <a:spLocks noGrp="1"/>
+          </p:cNvSpPr>
+          <p:nvPr>
+            <p:ph type="body" sz="half" idx="2"/>
+          </p:nvPr>
+        </p:nvSpPr>
+        <p:spPr>
+          <a:xfrm>
+            <a:off x="590719" y="2330505"/>
+            <a:ext cx="4559425" cy="3979585"/>
+          </a:xfrm>
+        </p:spPr>
+        <p:txBody>
+          <a:bodyPr vert="horz" lIns="91440" tIns="45720" rIns="91440" bIns="45720" rtlCol="0" anchor="ctr">
+            <a:normAutofit fontScale="92500" lnSpcReduction="10000"/>
+          </a:bodyPr>
+          <a:lstStyle/>
+          <a:p>
+            <a:r>
+              <a:rPr lang="en-US" sz="1600" dirty="0"/>
+              <a:t>Future work should focus on feature engineering by introducing additional factors such as employment history, debt-to-income ratio, and previous loan history, and exploring interactions between existing features to capture more complex relationships. Hyperparameter tuning through methods like Grid Search or Random Search could further enhance model performance. Advanced models, including neural networks, should be tested for their ability to capture non-linear relationships, and ensemble methods should be explored to create a more robust predictive system. To improve model interpretability, SHAP values can be used to explain model predictions, ensuring stakeholders understand the decision-making process, and feature importance analysis can identify the most influential factors in loan approval decisions. By addressing these areas, the predictive accuracy and robustness of the models can be enhanced, leading to more reliable and effective loan approval systems in real-world applications.</a:t>
+            </a:r>
+            <a:endParaRPr lang="en-US" sz="1400" dirty="0"/>
+          </a:p>
+        </p:txBody>
+      </p:sp>
+      <p:sp>
+        <p:nvSpPr>
+          <p:cNvPr id="177" name="Rectangle 176">
+            <a:extLst>
+              <a:ext uri="{FF2B5EF4-FFF2-40B4-BE49-F238E27FC236}">
+                <a16:creationId xmlns:a16="http://schemas.microsoft.com/office/drawing/2014/main" id="{C13237C8-E62C-4F0D-A318-BD6FB6C2D138}"/>
+              </a:ext>
+              <a:ext uri="{C183D7F6-B498-43B3-948B-1728B52AA6E4}">
+                <adec:decorative xmlns:adec="http://schemas.microsoft.com/office/drawing/2017/decorative" val="1"/>
+              </a:ext>
+            </a:extLst>
+          </p:cNvPr>
+          <p:cNvSpPr>
+            <a:spLocks noGrp="1" noRot="1" noChangeAspect="1" noMove="1" noResize="1" noEditPoints="1" noAdjustHandles="1" noChangeArrowheads="1" noChangeShapeType="1" noTextEdit="1"/>
+          </p:cNvSpPr>
+          <p:nvPr>
+            <p:extLst>
+              <p:ext uri="{386F3935-93C4-4BCD-93E2-E3B085C9AB24}">
+                <p16:designElem xmlns:p16="http://schemas.microsoft.com/office/powerpoint/2015/main" val="1"/>
+              </p:ext>
+            </p:extLst>
+          </p:nvPr>
+        </p:nvSpPr>
+        <p:spPr>
+          <a:xfrm flipH="1">
+            <a:off x="10697670" y="0"/>
+            <a:ext cx="1494330" cy="6858000"/>
+          </a:xfrm>
+          <a:prstGeom prst="rect">
+            <a:avLst/>
+          </a:prstGeom>
+          <a:solidFill>
+            <a:schemeClr val="accent4"/>
+          </a:solidFill>
+          <a:ln>
+            <a:noFill/>
+          </a:ln>
+        </p:spPr>
+        <p:style>
+          <a:lnRef idx="2">
+            <a:schemeClr val="accent1">
+              <a:shade val="50000"/>
+            </a:schemeClr>
+          </a:lnRef>
+          <a:fillRef idx="1">
+            <a:schemeClr val="accent1"/>
+          </a:fillRef>
+          <a:effectRef idx="0">
+            <a:schemeClr val="accent1"/>
+          </a:effectRef>
+          <a:fontRef idx="minor">
+            <a:schemeClr val="lt1"/>
+          </a:fontRef>
+        </p:style>
+        <p:txBody>
+          <a:bodyPr rtlCol="0" anchor="ctr"/>
+          <a:lstStyle/>
+          <a:p>
+            <a:pPr algn="ctr"/>
+            <a:endParaRPr lang="en-US"/>
+          </a:p>
+        </p:txBody>
+      </p:sp>
+      <p:sp>
+        <p:nvSpPr>
+          <p:cNvPr id="178" name="Rectangle 177">
+            <a:extLst>
+              <a:ext uri="{FF2B5EF4-FFF2-40B4-BE49-F238E27FC236}">
+                <a16:creationId xmlns:a16="http://schemas.microsoft.com/office/drawing/2014/main" id="{19C9EAEA-39D0-4B0E-A0EB-51E7B26740B1}"/>
+              </a:ext>
+              <a:ext uri="{C183D7F6-B498-43B3-948B-1728B52AA6E4}">
+                <adec:decorative xmlns:adec="http://schemas.microsoft.com/office/drawing/2017/decorative" val="1"/>
+              </a:ext>
+            </a:extLst>
+          </p:cNvPr>
+          <p:cNvSpPr>
+            <a:spLocks noGrp="1" noRot="1" noChangeAspect="1" noMove="1" noResize="1" noEditPoints="1" noAdjustHandles="1" noChangeArrowheads="1" noChangeShapeType="1" noTextEdit="1"/>
+          </p:cNvSpPr>
+          <p:nvPr>
+            <p:extLst>
+              <p:ext uri="{386F3935-93C4-4BCD-93E2-E3B085C9AB24}">
+                <p16:designElem xmlns:p16="http://schemas.microsoft.com/office/powerpoint/2015/main" val="1"/>
+              </p:ext>
+            </p:extLst>
+          </p:nvPr>
+        </p:nvSpPr>
+        <p:spPr>
+          <a:xfrm>
+            <a:off x="5685810" y="513853"/>
+            <a:ext cx="6009366" cy="5834577"/>
+          </a:xfrm>
+          <a:prstGeom prst="rect">
+            <a:avLst/>
+          </a:prstGeom>
+          <a:solidFill>
+            <a:schemeClr val="bg1"/>
+          </a:solidFill>
+          <a:ln>
+            <a:noFill/>
+          </a:ln>
+          <a:effectLst>
+            <a:outerShdw blurRad="139700" dist="127000" dir="5400000" algn="t" rotWithShape="0">
+              <a:prstClr val="black">
+                <a:alpha val="15000"/>
+              </a:prstClr>
+            </a:outerShdw>
+          </a:effectLst>
+        </p:spPr>
+        <p:style>
+          <a:lnRef idx="2">
+            <a:schemeClr val="accent1">
+              <a:shade val="50000"/>
+            </a:schemeClr>
+          </a:lnRef>
+          <a:fillRef idx="1">
+            <a:schemeClr val="accent1"/>
+          </a:fillRef>
+          <a:effectRef idx="0">
+            <a:schemeClr val="accent1"/>
+          </a:effectRef>
+          <a:fontRef idx="minor">
+            <a:schemeClr val="lt1"/>
+          </a:fontRef>
+        </p:style>
+        <p:txBody>
+          <a:bodyPr rtlCol="0" anchor="ctr"/>
+          <a:lstStyle/>
+          <a:p>
+            <a:pPr algn="ctr"/>
+            <a:endParaRPr lang="en-US"/>
+          </a:p>
+        </p:txBody>
+      </p:sp>
+      <p:pic>
+        <p:nvPicPr>
+          <p:cNvPr id="8" name="Content Placeholder 7">
+            <a:extLst>
+              <a:ext uri="{FF2B5EF4-FFF2-40B4-BE49-F238E27FC236}">
+                <a16:creationId xmlns:a16="http://schemas.microsoft.com/office/drawing/2014/main" id="{127D63FC-4FED-53C4-4789-2758F2ED8C5C}"/>
+              </a:ext>
+            </a:extLst>
+          </p:cNvPr>
+          <p:cNvPicPr>
+            <a:picLocks noGrp="1" noChangeAspect="1"/>
+          </p:cNvPicPr>
+          <p:nvPr>
+            <p:ph idx="1"/>
+          </p:nvPr>
+        </p:nvPicPr>
+        <p:blipFill rotWithShape="1">
+          <a:blip r:embed="rId2">
+            <a:extLst>
+              <a:ext uri="{28A0092B-C50C-407E-A947-70E740481C1C}">
+                <a14:useLocalDpi xmlns:a14="http://schemas.microsoft.com/office/drawing/2010/main" val="0"/>
+              </a:ext>
+            </a:extLst>
+          </a:blip>
+          <a:srcRect l="28987" r="2365" b="-1"/>
+          <a:stretch/>
+        </p:blipFill>
+        <p:spPr>
+          <a:xfrm>
+            <a:off x="5977788" y="799352"/>
+            <a:ext cx="5425410" cy="5259296"/>
+          </a:xfrm>
+          <a:prstGeom prst="rect">
+            <a:avLst/>
+          </a:prstGeom>
+        </p:spPr>
+      </p:pic>
+    </p:spTree>
+    <p:extLst>
+      <p:ext uri="{BB962C8B-B14F-4D97-AF65-F5344CB8AC3E}">
+        <p14:creationId xmlns:p14="http://schemas.microsoft.com/office/powerpoint/2010/main" val="3000181564"/>
       </p:ext>
     </p:extLst>
   </p:cSld>

</xml_diff>